<commit_message>
added the preDissertation and presentation as well as the architecture drawio file
</commit_message>
<xml_diff>
--- a/PDE_PreDissertation.pptx
+++ b/PDE_PreDissertation.pptx
@@ -5,15 +5,22 @@
     <p:sldMasterId id="2147483648" r:id="rId1"/>
   </p:sldMasterIdLst>
   <p:notesMasterIdLst>
-    <p:notesMasterId r:id="rId5"/>
+    <p:notesMasterId r:id="rId12"/>
   </p:notesMasterIdLst>
   <p:handoutMasterIdLst>
-    <p:handoutMasterId r:id="rId6"/>
+    <p:handoutMasterId r:id="rId13"/>
   </p:handoutMasterIdLst>
   <p:sldIdLst>
     <p:sldId id="256" r:id="rId2"/>
-    <p:sldId id="260" r:id="rId3"/>
-    <p:sldId id="258" r:id="rId4"/>
+    <p:sldId id="261" r:id="rId3"/>
+    <p:sldId id="265" r:id="rId4"/>
+    <p:sldId id="267" r:id="rId5"/>
+    <p:sldId id="268" r:id="rId6"/>
+    <p:sldId id="257" r:id="rId7"/>
+    <p:sldId id="264" r:id="rId8"/>
+    <p:sldId id="263" r:id="rId9"/>
+    <p:sldId id="262" r:id="rId10"/>
+    <p:sldId id="266" r:id="rId11"/>
   </p:sldIdLst>
   <p:sldSz cx="12192000" cy="6858000"/>
   <p:notesSz cx="6805613" cy="9944100"/>
@@ -291,7 +298,7 @@
               <a:pPr>
                 <a:defRPr/>
               </a:pPr>
-              <a:t>1/18/2023</a:t>
+              <a:t>1/22/2023</a:t>
             </a:fld>
             <a:endParaRPr lang="en-US"/>
           </a:p>
@@ -487,7 +494,7 @@
               <a:pPr>
                 <a:defRPr/>
               </a:pPr>
-              <a:t>1/18/2023</a:t>
+              <a:t>1/22/2023</a:t>
             </a:fld>
             <a:endParaRPr lang="en-US"/>
           </a:p>
@@ -881,7 +888,7 @@
               </a:pPr>
               <a:t>1</a:t>
             </a:fld>
-            <a:endParaRPr lang="en-US"/>
+            <a:endParaRPr lang="en-US" dirty="0"/>
           </a:p>
         </p:txBody>
       </p:sp>
@@ -984,17 +991,17 @@
           </a:ln>
           <a:extLst>
             <a:ext uri="{FAA26D3D-D897-4be2-8F04-BA451C77F1D7}">
-              <ma14:placeholderFlag xmlns:ma14="http://schemas.microsoft.com/office/mac/drawingml/2011/main" xmlns="" val="1"/>
+              <ma14:placeholderFlag xmlns="" xmlns:ma14="http://schemas.microsoft.com/office/mac/drawingml/2011/main" val="1"/>
             </a:ext>
             <a:ext uri="{909E8E84-426E-40dd-AFC4-6F175D3DCCD1}">
-              <a14:hiddenFill xmlns:a14="http://schemas.microsoft.com/office/drawing/2010/main" xmlns="">
+              <a14:hiddenFill xmlns="" xmlns:a14="http://schemas.microsoft.com/office/drawing/2010/main">
                 <a:solidFill>
                   <a:srgbClr val="FFFFFF"/>
                 </a:solidFill>
               </a14:hiddenFill>
             </a:ext>
             <a:ext uri="{91240B29-F687-4f45-9708-019B960494DF}">
-              <a14:hiddenLine xmlns:a14="http://schemas.microsoft.com/office/drawing/2010/main" xmlns="" w="9525">
+              <a14:hiddenLine xmlns="" xmlns:a14="http://schemas.microsoft.com/office/drawing/2010/main" w="9525">
                 <a:solidFill>
                   <a:srgbClr val="000000"/>
                 </a:solidFill>
@@ -2263,17 +2270,17 @@
           </a:ln>
           <a:extLst>
             <a:ext uri="{FAA26D3D-D897-4be2-8F04-BA451C77F1D7}">
-              <ma14:placeholderFlag xmlns:ma14="http://schemas.microsoft.com/office/mac/drawingml/2011/main" xmlns="" val="1"/>
+              <ma14:placeholderFlag xmlns="" xmlns:ma14="http://schemas.microsoft.com/office/mac/drawingml/2011/main" val="1"/>
             </a:ext>
             <a:ext uri="{909E8E84-426E-40dd-AFC4-6F175D3DCCD1}">
-              <a14:hiddenFill xmlns:a14="http://schemas.microsoft.com/office/drawing/2010/main" xmlns="">
+              <a14:hiddenFill xmlns="" xmlns:a14="http://schemas.microsoft.com/office/drawing/2010/main">
                 <a:solidFill>
                   <a:srgbClr val="FFFFFF"/>
                 </a:solidFill>
               </a14:hiddenFill>
             </a:ext>
             <a:ext uri="{91240B29-F687-4f45-9708-019B960494DF}">
-              <a14:hiddenLine xmlns:a14="http://schemas.microsoft.com/office/drawing/2010/main" xmlns="" w="9525">
+              <a14:hiddenLine xmlns="" xmlns:a14="http://schemas.microsoft.com/office/drawing/2010/main" w="9525">
                 <a:solidFill>
                   <a:srgbClr val="000000"/>
                 </a:solidFill>
@@ -2324,17 +2331,17 @@
           </a:ln>
           <a:extLst>
             <a:ext uri="{FAA26D3D-D897-4be2-8F04-BA451C77F1D7}">
-              <ma14:placeholderFlag xmlns:ma14="http://schemas.microsoft.com/office/mac/drawingml/2011/main" xmlns="" val="1"/>
+              <ma14:placeholderFlag xmlns="" xmlns:ma14="http://schemas.microsoft.com/office/mac/drawingml/2011/main" val="1"/>
             </a:ext>
             <a:ext uri="{909E8E84-426E-40dd-AFC4-6F175D3DCCD1}">
-              <a14:hiddenFill xmlns:a14="http://schemas.microsoft.com/office/drawing/2010/main" xmlns="">
+              <a14:hiddenFill xmlns="" xmlns:a14="http://schemas.microsoft.com/office/drawing/2010/main">
                 <a:solidFill>
                   <a:srgbClr val="FFFFFF"/>
                 </a:solidFill>
               </a14:hiddenFill>
             </a:ext>
             <a:ext uri="{91240B29-F687-4f45-9708-019B960494DF}">
-              <a14:hiddenLine xmlns:a14="http://schemas.microsoft.com/office/drawing/2010/main" xmlns="" w="9525">
+              <a14:hiddenLine xmlns="" xmlns:a14="http://schemas.microsoft.com/office/drawing/2010/main" w="9525">
                 <a:solidFill>
                   <a:srgbClr val="000000"/>
                 </a:solidFill>
@@ -2544,7 +2551,7 @@
           </a:ln>
           <a:extLst>
             <a:ext uri="{909E8E84-426E-40dd-AFC4-6F175D3DCCD1}">
-              <a14:hiddenFill xmlns:a14="http://schemas.microsoft.com/office/drawing/2010/main" xmlns="">
+              <a14:hiddenFill xmlns="" xmlns:a14="http://schemas.microsoft.com/office/drawing/2010/main">
                 <a:solidFill>
                   <a:srgbClr val="FFFFFF">
                     <a:alpha val="50000"/>
@@ -2553,7 +2560,7 @@
               </a14:hiddenFill>
             </a:ext>
             <a:ext uri="{91240B29-F687-4f45-9708-019B960494DF}">
-              <a14:hiddenLine xmlns:a14="http://schemas.microsoft.com/office/drawing/2010/main" xmlns="" w="9525">
+              <a14:hiddenLine xmlns="" xmlns:a14="http://schemas.microsoft.com/office/drawing/2010/main" w="9525">
                 <a:solidFill>
                   <a:srgbClr val="000000"/>
                 </a:solidFill>
@@ -3158,7 +3165,7 @@
               <a:defRPr/>
             </a:pPr>
             <a:r>
-              <a:rPr lang="en-US"/>
+              <a:rPr lang="en-US" dirty="0"/>
               <a:t>DETI / MEI / PDE / 2022-23</a:t>
             </a:r>
           </a:p>
@@ -3207,7 +3214,1971 @@
 </p:sld>
 </file>
 
+<file path=ppt/slides/slide10.xml><?xml version="1.0" encoding="utf-8"?>
+<p:sld xmlns:a="http://schemas.openxmlformats.org/drawingml/2006/main" xmlns:r="http://schemas.openxmlformats.org/officeDocument/2006/relationships" xmlns:p="http://schemas.openxmlformats.org/presentationml/2006/main">
+  <p:cSld>
+    <p:spTree>
+      <p:nvGrpSpPr>
+        <p:cNvPr id="1" name=""/>
+        <p:cNvGrpSpPr/>
+        <p:nvPr/>
+      </p:nvGrpSpPr>
+      <p:grpSpPr>
+        <a:xfrm>
+          <a:off x="0" y="0"/>
+          <a:ext cx="0" cy="0"/>
+          <a:chOff x="0" y="0"/>
+          <a:chExt cx="0" cy="0"/>
+        </a:xfrm>
+      </p:grpSpPr>
+      <p:sp>
+        <p:nvSpPr>
+          <p:cNvPr id="2" name="Title 1">
+            <a:extLst>
+              <a:ext uri="{FF2B5EF4-FFF2-40B4-BE49-F238E27FC236}">
+                <a16:creationId xmlns:a16="http://schemas.microsoft.com/office/drawing/2014/main" id="{F7AA0AF1-5792-5160-4220-40F64218CBBF}"/>
+              </a:ext>
+            </a:extLst>
+          </p:cNvPr>
+          <p:cNvSpPr>
+            <a:spLocks noGrp="1"/>
+          </p:cNvSpPr>
+          <p:nvPr>
+            <p:ph type="title"/>
+          </p:nvPr>
+        </p:nvSpPr>
+        <p:spPr/>
+        <p:txBody>
+          <a:bodyPr/>
+          <a:lstStyle/>
+          <a:p>
+            <a:r>
+              <a:rPr lang="en-GB" dirty="0"/>
+              <a:t>Future Work</a:t>
+            </a:r>
+          </a:p>
+        </p:txBody>
+      </p:sp>
+      <p:pic>
+        <p:nvPicPr>
+          <p:cNvPr id="7" name="Content Placeholder 6" descr="A picture containing timeline&#10;&#10;Description automatically generated">
+            <a:extLst>
+              <a:ext uri="{FF2B5EF4-FFF2-40B4-BE49-F238E27FC236}">
+                <a16:creationId xmlns:a16="http://schemas.microsoft.com/office/drawing/2014/main" id="{CCE3F394-1758-C11F-F80B-5BD988FB3C76}"/>
+              </a:ext>
+            </a:extLst>
+          </p:cNvPr>
+          <p:cNvPicPr>
+            <a:picLocks noGrp="1" noChangeAspect="1"/>
+          </p:cNvPicPr>
+          <p:nvPr>
+            <p:ph idx="1"/>
+          </p:nvPr>
+        </p:nvPicPr>
+        <p:blipFill>
+          <a:blip r:embed="rId2" cstate="email">
+            <a:extLst>
+              <a:ext uri="{28A0092B-C50C-407E-A947-70E740481C1C}">
+                <a14:useLocalDpi xmlns:a14="http://schemas.microsoft.com/office/drawing/2010/main" val="0"/>
+              </a:ext>
+            </a:extLst>
+          </a:blip>
+          <a:stretch>
+            <a:fillRect/>
+          </a:stretch>
+        </p:blipFill>
+        <p:spPr>
+          <a:xfrm>
+            <a:off x="609600" y="2721702"/>
+            <a:ext cx="10972800" cy="1879733"/>
+          </a:xfrm>
+        </p:spPr>
+      </p:pic>
+      <p:sp>
+        <p:nvSpPr>
+          <p:cNvPr id="4" name="Slide Number Placeholder 3">
+            <a:extLst>
+              <a:ext uri="{FF2B5EF4-FFF2-40B4-BE49-F238E27FC236}">
+                <a16:creationId xmlns:a16="http://schemas.microsoft.com/office/drawing/2014/main" id="{DD20C8F7-E58E-7834-7E07-4F8F9858E3C7}"/>
+              </a:ext>
+            </a:extLst>
+          </p:cNvPr>
+          <p:cNvSpPr>
+            <a:spLocks noGrp="1"/>
+          </p:cNvSpPr>
+          <p:nvPr>
+            <p:ph type="sldNum" sz="quarter" idx="10"/>
+          </p:nvPr>
+        </p:nvSpPr>
+        <p:spPr/>
+        <p:txBody>
+          <a:bodyPr/>
+          <a:lstStyle/>
+          <a:p>
+            <a:pPr>
+              <a:defRPr/>
+            </a:pPr>
+            <a:fld id="{EF60A818-680D-8044-B769-B122DF9C5B6D}" type="slidenum">
+              <a:rPr lang="en-US" smtClean="0"/>
+              <a:pPr>
+                <a:defRPr/>
+              </a:pPr>
+              <a:t>10</a:t>
+            </a:fld>
+            <a:endParaRPr lang="en-US" dirty="0"/>
+          </a:p>
+        </p:txBody>
+      </p:sp>
+      <p:sp>
+        <p:nvSpPr>
+          <p:cNvPr id="5" name="Footer Placeholder 4">
+            <a:extLst>
+              <a:ext uri="{FF2B5EF4-FFF2-40B4-BE49-F238E27FC236}">
+                <a16:creationId xmlns:a16="http://schemas.microsoft.com/office/drawing/2014/main" id="{DD5921D7-3AF7-938E-4CC6-123C9B145584}"/>
+              </a:ext>
+            </a:extLst>
+          </p:cNvPr>
+          <p:cNvSpPr>
+            <a:spLocks noGrp="1"/>
+          </p:cNvSpPr>
+          <p:nvPr>
+            <p:ph type="ftr" sz="quarter" idx="11"/>
+          </p:nvPr>
+        </p:nvSpPr>
+        <p:spPr/>
+        <p:txBody>
+          <a:bodyPr/>
+          <a:lstStyle/>
+          <a:p>
+            <a:pPr>
+              <a:defRPr/>
+            </a:pPr>
+            <a:r>
+              <a:rPr lang="en-US"/>
+              <a:t>DETI / MEI / PDE / 2022-23</a:t>
+            </a:r>
+          </a:p>
+        </p:txBody>
+      </p:sp>
+    </p:spTree>
+    <p:extLst>
+      <p:ext uri="{BB962C8B-B14F-4D97-AF65-F5344CB8AC3E}">
+        <p14:creationId xmlns:p14="http://schemas.microsoft.com/office/powerpoint/2010/main" val="2372570182"/>
+      </p:ext>
+    </p:extLst>
+  </p:cSld>
+  <p:clrMapOvr>
+    <a:masterClrMapping/>
+  </p:clrMapOvr>
+</p:sld>
+</file>
+
 <file path=ppt/slides/slide2.xml><?xml version="1.0" encoding="utf-8"?>
+<p:sld xmlns:a="http://schemas.openxmlformats.org/drawingml/2006/main" xmlns:r="http://schemas.openxmlformats.org/officeDocument/2006/relationships" xmlns:p="http://schemas.openxmlformats.org/presentationml/2006/main">
+  <p:cSld>
+    <p:spTree>
+      <p:nvGrpSpPr>
+        <p:cNvPr id="1" name=""/>
+        <p:cNvGrpSpPr/>
+        <p:nvPr/>
+      </p:nvGrpSpPr>
+      <p:grpSpPr>
+        <a:xfrm>
+          <a:off x="0" y="0"/>
+          <a:ext cx="0" cy="0"/>
+          <a:chOff x="0" y="0"/>
+          <a:chExt cx="0" cy="0"/>
+        </a:xfrm>
+      </p:grpSpPr>
+      <p:sp>
+        <p:nvSpPr>
+          <p:cNvPr id="2" name="Title 1">
+            <a:extLst>
+              <a:ext uri="{FF2B5EF4-FFF2-40B4-BE49-F238E27FC236}">
+                <a16:creationId xmlns:a16="http://schemas.microsoft.com/office/drawing/2014/main" id="{0F20247C-455A-151D-D7B0-0F8207AE342A}"/>
+              </a:ext>
+            </a:extLst>
+          </p:cNvPr>
+          <p:cNvSpPr>
+            <a:spLocks noGrp="1"/>
+          </p:cNvSpPr>
+          <p:nvPr>
+            <p:ph type="title"/>
+          </p:nvPr>
+        </p:nvSpPr>
+        <p:spPr/>
+        <p:txBody>
+          <a:bodyPr/>
+          <a:lstStyle/>
+          <a:p>
+            <a:r>
+              <a:rPr lang="en-GB" dirty="0">
+                <a:latin typeface="Helvetica Neue"/>
+              </a:rPr>
+              <a:t>Motivation</a:t>
+            </a:r>
+            <a:endParaRPr lang="pt-PT" dirty="0"/>
+          </a:p>
+        </p:txBody>
+      </p:sp>
+      <p:sp>
+        <p:nvSpPr>
+          <p:cNvPr id="3" name="Content Placeholder 2">
+            <a:extLst>
+              <a:ext uri="{FF2B5EF4-FFF2-40B4-BE49-F238E27FC236}">
+                <a16:creationId xmlns:a16="http://schemas.microsoft.com/office/drawing/2014/main" id="{FC10621F-C091-A47B-4156-B2840F9C0ECF}"/>
+              </a:ext>
+            </a:extLst>
+          </p:cNvPr>
+          <p:cNvSpPr>
+            <a:spLocks noGrp="1"/>
+          </p:cNvSpPr>
+          <p:nvPr>
+            <p:ph idx="1"/>
+          </p:nvPr>
+        </p:nvSpPr>
+        <p:spPr>
+          <a:xfrm>
+            <a:off x="609600" y="1196975"/>
+            <a:ext cx="4219575" cy="4918075"/>
+          </a:xfrm>
+        </p:spPr>
+        <p:txBody>
+          <a:bodyPr/>
+          <a:lstStyle/>
+          <a:p>
+            <a:pPr>
+              <a:buFont typeface="Arial" panose="020B0604020202020204" pitchFamily="34" charset="0"/>
+              <a:buChar char="•"/>
+            </a:pPr>
+            <a:r>
+              <a:rPr lang="pt-PT" dirty="0" err="1"/>
+              <a:t>Increasingly</a:t>
+            </a:r>
+            <a:r>
+              <a:rPr lang="pt-PT" dirty="0"/>
+              <a:t> </a:t>
+            </a:r>
+            <a:r>
+              <a:rPr lang="pt-PT" dirty="0" err="1"/>
+              <a:t>high</a:t>
+            </a:r>
+            <a:r>
+              <a:rPr lang="pt-PT" dirty="0"/>
+              <a:t> </a:t>
+            </a:r>
+            <a:r>
+              <a:rPr lang="en-US" dirty="0"/>
+              <a:t>number</a:t>
+            </a:r>
+            <a:r>
+              <a:rPr lang="pt-PT" dirty="0"/>
+              <a:t> </a:t>
+            </a:r>
+            <a:r>
+              <a:rPr lang="pt-PT" dirty="0" err="1"/>
+              <a:t>of</a:t>
+            </a:r>
+            <a:r>
+              <a:rPr lang="pt-PT" dirty="0"/>
+              <a:t> </a:t>
+            </a:r>
+            <a:r>
+              <a:rPr lang="pt-PT" dirty="0" err="1"/>
+              <a:t>vehicles</a:t>
+            </a:r>
+            <a:endParaRPr lang="pt-PT" dirty="0"/>
+          </a:p>
+          <a:p>
+            <a:pPr lvl="1">
+              <a:buFont typeface="Arial" panose="020B0604020202020204" pitchFamily="34" charset="0"/>
+              <a:buChar char="•"/>
+            </a:pPr>
+            <a:r>
+              <a:rPr lang="pt-PT" dirty="0" err="1"/>
+              <a:t>Road</a:t>
+            </a:r>
+            <a:r>
+              <a:rPr lang="pt-PT" dirty="0"/>
+              <a:t> </a:t>
+            </a:r>
+            <a:r>
+              <a:rPr lang="pt-PT" dirty="0" err="1"/>
+              <a:t>degradation</a:t>
+            </a:r>
+            <a:endParaRPr lang="pt-PT" dirty="0"/>
+          </a:p>
+          <a:p>
+            <a:pPr lvl="1">
+              <a:buFont typeface="Arial" panose="020B0604020202020204" pitchFamily="34" charset="0"/>
+              <a:buChar char="•"/>
+            </a:pPr>
+            <a:r>
+              <a:rPr lang="pt-PT" dirty="0" err="1"/>
+              <a:t>Congestion</a:t>
+            </a:r>
+            <a:r>
+              <a:rPr lang="pt-PT" dirty="0"/>
+              <a:t> </a:t>
+            </a:r>
+          </a:p>
+          <a:p>
+            <a:pPr lvl="1">
+              <a:buFont typeface="Arial" panose="020B0604020202020204" pitchFamily="34" charset="0"/>
+              <a:buChar char="•"/>
+            </a:pPr>
+            <a:r>
+              <a:rPr lang="pt-PT" dirty="0" err="1"/>
+              <a:t>Accidents</a:t>
+            </a:r>
+            <a:endParaRPr lang="pt-PT" dirty="0"/>
+          </a:p>
+          <a:p>
+            <a:pPr>
+              <a:buFont typeface="Arial" panose="020B0604020202020204" pitchFamily="34" charset="0"/>
+              <a:buChar char="•"/>
+            </a:pPr>
+            <a:r>
+              <a:rPr lang="pt-PT" dirty="0" err="1"/>
+              <a:t>Climate</a:t>
+            </a:r>
+            <a:r>
+              <a:rPr lang="pt-PT" dirty="0"/>
+              <a:t> </a:t>
+            </a:r>
+            <a:r>
+              <a:rPr lang="pt-PT" dirty="0" err="1"/>
+              <a:t>change</a:t>
+            </a:r>
+            <a:endParaRPr lang="pt-PT" dirty="0"/>
+          </a:p>
+          <a:p>
+            <a:pPr lvl="1">
+              <a:buFont typeface="Arial" panose="020B0604020202020204" pitchFamily="34" charset="0"/>
+              <a:buChar char="•"/>
+            </a:pPr>
+            <a:r>
+              <a:rPr lang="pt-PT" dirty="0" err="1"/>
+              <a:t>Dangerous</a:t>
+            </a:r>
+            <a:r>
+              <a:rPr lang="pt-PT" dirty="0"/>
+              <a:t> </a:t>
+            </a:r>
+            <a:r>
+              <a:rPr lang="pt-PT" dirty="0" err="1"/>
+              <a:t>weather</a:t>
+            </a:r>
+            <a:r>
+              <a:rPr lang="pt-PT" dirty="0"/>
+              <a:t> </a:t>
+            </a:r>
+            <a:r>
+              <a:rPr lang="pt-PT" dirty="0" err="1"/>
+              <a:t>events</a:t>
+            </a:r>
+            <a:endParaRPr lang="pt-PT" dirty="0"/>
+          </a:p>
+          <a:p>
+            <a:pPr marL="30162" indent="0">
+              <a:buNone/>
+            </a:pPr>
+            <a:r>
+              <a:rPr lang="pt-PT" dirty="0" err="1"/>
+              <a:t>VRUs</a:t>
+            </a:r>
+            <a:r>
+              <a:rPr lang="pt-PT" dirty="0"/>
+              <a:t> are </a:t>
+            </a:r>
+            <a:r>
+              <a:rPr lang="pt-PT" dirty="0" err="1"/>
+              <a:t>the</a:t>
+            </a:r>
+            <a:r>
+              <a:rPr lang="pt-PT" dirty="0"/>
+              <a:t> </a:t>
+            </a:r>
+            <a:r>
+              <a:rPr lang="pt-PT" dirty="0" err="1"/>
+              <a:t>most</a:t>
+            </a:r>
+            <a:r>
+              <a:rPr lang="pt-PT" dirty="0"/>
+              <a:t> </a:t>
+            </a:r>
+            <a:r>
+              <a:rPr lang="pt-PT" dirty="0" err="1"/>
+              <a:t>endangered</a:t>
+            </a:r>
+            <a:r>
+              <a:rPr lang="pt-PT" dirty="0"/>
+              <a:t>!</a:t>
+            </a:r>
+          </a:p>
+          <a:p>
+            <a:pPr lvl="1">
+              <a:buFont typeface="Arial" panose="020B0604020202020204" pitchFamily="34" charset="0"/>
+              <a:buChar char="•"/>
+            </a:pPr>
+            <a:r>
+              <a:rPr lang="pt-PT" dirty="0"/>
+              <a:t>C-ITS </a:t>
+            </a:r>
+            <a:r>
+              <a:rPr lang="pt-PT" dirty="0" err="1"/>
+              <a:t>and</a:t>
+            </a:r>
+            <a:r>
+              <a:rPr lang="pt-PT" dirty="0"/>
+              <a:t> V2X</a:t>
+            </a:r>
+          </a:p>
+          <a:p>
+            <a:pPr lvl="1">
+              <a:buFont typeface="Arial" panose="020B0604020202020204" pitchFamily="34" charset="0"/>
+              <a:buChar char="•"/>
+            </a:pPr>
+            <a:r>
+              <a:rPr lang="pt-PT" dirty="0" err="1"/>
+              <a:t>Cooperative</a:t>
+            </a:r>
+            <a:r>
+              <a:rPr lang="pt-PT" dirty="0"/>
+              <a:t> </a:t>
+            </a:r>
+            <a:r>
+              <a:rPr lang="pt-PT" dirty="0" err="1"/>
+              <a:t>Awareness</a:t>
+            </a:r>
+            <a:endParaRPr lang="pt-PT" dirty="0"/>
+          </a:p>
+          <a:p>
+            <a:pPr marL="30162" indent="0">
+              <a:buNone/>
+            </a:pPr>
+            <a:endParaRPr lang="pt-PT" dirty="0"/>
+          </a:p>
+          <a:p>
+            <a:pPr>
+              <a:buFont typeface="Arial" panose="020B0604020202020204" pitchFamily="34" charset="0"/>
+              <a:buChar char="•"/>
+            </a:pPr>
+            <a:endParaRPr lang="pt-PT" dirty="0"/>
+          </a:p>
+          <a:p>
+            <a:pPr marL="30162" indent="0">
+              <a:buNone/>
+            </a:pPr>
+            <a:endParaRPr lang="pt-PT" dirty="0"/>
+          </a:p>
+          <a:p>
+            <a:pPr>
+              <a:buFont typeface="Arial" panose="020B0604020202020204" pitchFamily="34" charset="0"/>
+              <a:buChar char="•"/>
+            </a:pPr>
+            <a:endParaRPr lang="pt-PT" dirty="0"/>
+          </a:p>
+          <a:p>
+            <a:pPr lvl="1">
+              <a:buFont typeface="Arial" panose="020B0604020202020204" pitchFamily="34" charset="0"/>
+              <a:buChar char="•"/>
+            </a:pPr>
+            <a:endParaRPr lang="pt-PT" dirty="0"/>
+          </a:p>
+          <a:p>
+            <a:pPr lvl="1">
+              <a:buFont typeface="Arial" panose="020B0604020202020204" pitchFamily="34" charset="0"/>
+              <a:buChar char="•"/>
+            </a:pPr>
+            <a:endParaRPr lang="pt-PT" dirty="0"/>
+          </a:p>
+          <a:p>
+            <a:pPr>
+              <a:buFont typeface="Arial" panose="020B0604020202020204" pitchFamily="34" charset="0"/>
+              <a:buChar char="•"/>
+            </a:pPr>
+            <a:endParaRPr lang="pt-PT" dirty="0"/>
+          </a:p>
+        </p:txBody>
+      </p:sp>
+      <p:sp>
+        <p:nvSpPr>
+          <p:cNvPr id="4" name="Slide Number Placeholder 3">
+            <a:extLst>
+              <a:ext uri="{FF2B5EF4-FFF2-40B4-BE49-F238E27FC236}">
+                <a16:creationId xmlns:a16="http://schemas.microsoft.com/office/drawing/2014/main" id="{70718B6D-0B6A-8C07-64D2-8B24FFD56CBD}"/>
+              </a:ext>
+            </a:extLst>
+          </p:cNvPr>
+          <p:cNvSpPr>
+            <a:spLocks noGrp="1"/>
+          </p:cNvSpPr>
+          <p:nvPr>
+            <p:ph type="sldNum" sz="quarter" idx="10"/>
+          </p:nvPr>
+        </p:nvSpPr>
+        <p:spPr/>
+        <p:txBody>
+          <a:bodyPr/>
+          <a:lstStyle/>
+          <a:p>
+            <a:pPr>
+              <a:defRPr/>
+            </a:pPr>
+            <a:fld id="{EF60A818-680D-8044-B769-B122DF9C5B6D}" type="slidenum">
+              <a:rPr lang="en-US" smtClean="0"/>
+              <a:pPr>
+                <a:defRPr/>
+              </a:pPr>
+              <a:t>2</a:t>
+            </a:fld>
+            <a:endParaRPr lang="en-US" dirty="0"/>
+          </a:p>
+        </p:txBody>
+      </p:sp>
+      <p:sp>
+        <p:nvSpPr>
+          <p:cNvPr id="5" name="Footer Placeholder 4">
+            <a:extLst>
+              <a:ext uri="{FF2B5EF4-FFF2-40B4-BE49-F238E27FC236}">
+                <a16:creationId xmlns:a16="http://schemas.microsoft.com/office/drawing/2014/main" id="{9B847922-DAB3-C732-69F7-0E34A01785DB}"/>
+              </a:ext>
+            </a:extLst>
+          </p:cNvPr>
+          <p:cNvSpPr>
+            <a:spLocks noGrp="1"/>
+          </p:cNvSpPr>
+          <p:nvPr>
+            <p:ph type="ftr" sz="quarter" idx="11"/>
+          </p:nvPr>
+        </p:nvSpPr>
+        <p:spPr/>
+        <p:txBody>
+          <a:bodyPr/>
+          <a:lstStyle/>
+          <a:p>
+            <a:pPr>
+              <a:defRPr/>
+            </a:pPr>
+            <a:r>
+              <a:rPr lang="en-US"/>
+              <a:t>DETI / MEI / PDE / 2022-23</a:t>
+            </a:r>
+          </a:p>
+        </p:txBody>
+      </p:sp>
+      <p:grpSp>
+        <p:nvGrpSpPr>
+          <p:cNvPr id="9" name="Group 8">
+            <a:extLst>
+              <a:ext uri="{FF2B5EF4-FFF2-40B4-BE49-F238E27FC236}">
+                <a16:creationId xmlns:a16="http://schemas.microsoft.com/office/drawing/2014/main" id="{1D5ADD67-E714-D7FC-F9FD-02F4959EBF65}"/>
+              </a:ext>
+            </a:extLst>
+          </p:cNvPr>
+          <p:cNvGrpSpPr/>
+          <p:nvPr/>
+        </p:nvGrpSpPr>
+        <p:grpSpPr>
+          <a:xfrm>
+            <a:off x="4933950" y="1773498"/>
+            <a:ext cx="6648450" cy="3776142"/>
+            <a:chOff x="4933950" y="1766614"/>
+            <a:chExt cx="6648450" cy="3776142"/>
+          </a:xfrm>
+        </p:grpSpPr>
+        <p:pic>
+          <p:nvPicPr>
+            <p:cNvPr id="7" name="Picture 6">
+              <a:extLst>
+                <a:ext uri="{FF2B5EF4-FFF2-40B4-BE49-F238E27FC236}">
+                  <a16:creationId xmlns:a16="http://schemas.microsoft.com/office/drawing/2014/main" id="{E5FFFCF0-3BB5-A392-32EB-120490AEF820}"/>
+                </a:ext>
+              </a:extLst>
+            </p:cNvPr>
+            <p:cNvPicPr>
+              <a:picLocks noChangeAspect="1"/>
+            </p:cNvPicPr>
+            <p:nvPr/>
+          </p:nvPicPr>
+          <p:blipFill>
+            <a:blip r:embed="rId2"/>
+            <a:stretch>
+              <a:fillRect/>
+            </a:stretch>
+          </p:blipFill>
+          <p:spPr>
+            <a:xfrm>
+              <a:off x="4933950" y="1766614"/>
+              <a:ext cx="6648450" cy="3381922"/>
+            </a:xfrm>
+            <a:prstGeom prst="rect">
+              <a:avLst/>
+            </a:prstGeom>
+          </p:spPr>
+        </p:pic>
+        <p:sp>
+          <p:nvSpPr>
+            <p:cNvPr id="8" name="TextBox 7">
+              <a:extLst>
+                <a:ext uri="{FF2B5EF4-FFF2-40B4-BE49-F238E27FC236}">
+                  <a16:creationId xmlns:a16="http://schemas.microsoft.com/office/drawing/2014/main" id="{D83A3E09-3A35-AA2E-0D6A-F96C894603A6}"/>
+                </a:ext>
+              </a:extLst>
+            </p:cNvPr>
+            <p:cNvSpPr txBox="1"/>
+            <p:nvPr/>
+          </p:nvSpPr>
+          <p:spPr>
+            <a:xfrm>
+              <a:off x="6435881" y="5081091"/>
+              <a:ext cx="3644587" cy="461665"/>
+            </a:xfrm>
+            <a:prstGeom prst="rect">
+              <a:avLst/>
+            </a:prstGeom>
+            <a:noFill/>
+          </p:spPr>
+          <p:txBody>
+            <a:bodyPr wrap="none" rtlCol="0">
+              <a:spAutoFit/>
+            </a:bodyPr>
+            <a:lstStyle/>
+            <a:p>
+              <a:r>
+                <a:rPr lang="en-US" dirty="0"/>
+                <a:t>Vehicles in use in Europe</a:t>
+              </a:r>
+            </a:p>
+          </p:txBody>
+        </p:sp>
+      </p:grpSp>
+    </p:spTree>
+    <p:extLst>
+      <p:ext uri="{BB962C8B-B14F-4D97-AF65-F5344CB8AC3E}">
+        <p14:creationId xmlns:p14="http://schemas.microsoft.com/office/powerpoint/2010/main" val="2340335842"/>
+      </p:ext>
+    </p:extLst>
+  </p:cSld>
+  <p:clrMapOvr>
+    <a:masterClrMapping/>
+  </p:clrMapOvr>
+</p:sld>
+</file>
+
+<file path=ppt/slides/slide3.xml><?xml version="1.0" encoding="utf-8"?>
+<p:sld xmlns:a="http://schemas.openxmlformats.org/drawingml/2006/main" xmlns:r="http://schemas.openxmlformats.org/officeDocument/2006/relationships" xmlns:p="http://schemas.openxmlformats.org/presentationml/2006/main">
+  <p:cSld>
+    <p:spTree>
+      <p:nvGrpSpPr>
+        <p:cNvPr id="1" name=""/>
+        <p:cNvGrpSpPr/>
+        <p:nvPr/>
+      </p:nvGrpSpPr>
+      <p:grpSpPr>
+        <a:xfrm>
+          <a:off x="0" y="0"/>
+          <a:ext cx="0" cy="0"/>
+          <a:chOff x="0" y="0"/>
+          <a:chExt cx="0" cy="0"/>
+        </a:xfrm>
+      </p:grpSpPr>
+      <p:sp>
+        <p:nvSpPr>
+          <p:cNvPr id="2" name="Title 1">
+            <a:extLst>
+              <a:ext uri="{FF2B5EF4-FFF2-40B4-BE49-F238E27FC236}">
+                <a16:creationId xmlns:a16="http://schemas.microsoft.com/office/drawing/2014/main" id="{4CC47DE5-732E-333E-8811-4501C385CC57}"/>
+              </a:ext>
+            </a:extLst>
+          </p:cNvPr>
+          <p:cNvSpPr>
+            <a:spLocks noGrp="1"/>
+          </p:cNvSpPr>
+          <p:nvPr>
+            <p:ph type="title"/>
+          </p:nvPr>
+        </p:nvSpPr>
+        <p:spPr/>
+        <p:txBody>
+          <a:bodyPr/>
+          <a:lstStyle/>
+          <a:p>
+            <a:r>
+              <a:rPr lang="en-GB" dirty="0">
+                <a:latin typeface="Helvetica Neue"/>
+              </a:rPr>
+              <a:t>Objectives / User Modes</a:t>
+            </a:r>
+            <a:endParaRPr lang="en-GB" dirty="0"/>
+          </a:p>
+        </p:txBody>
+      </p:sp>
+      <p:sp>
+        <p:nvSpPr>
+          <p:cNvPr id="3" name="Content Placeholder 2">
+            <a:extLst>
+              <a:ext uri="{FF2B5EF4-FFF2-40B4-BE49-F238E27FC236}">
+                <a16:creationId xmlns:a16="http://schemas.microsoft.com/office/drawing/2014/main" id="{BEA3BC5B-9CE5-39E0-45D7-9ADB5CFAB148}"/>
+              </a:ext>
+            </a:extLst>
+          </p:cNvPr>
+          <p:cNvSpPr>
+            <a:spLocks noGrp="1"/>
+          </p:cNvSpPr>
+          <p:nvPr>
+            <p:ph idx="1"/>
+          </p:nvPr>
+        </p:nvSpPr>
+        <p:spPr>
+          <a:xfrm>
+            <a:off x="609600" y="1196975"/>
+            <a:ext cx="5114925" cy="4929188"/>
+          </a:xfrm>
+        </p:spPr>
+        <p:txBody>
+          <a:bodyPr/>
+          <a:lstStyle/>
+          <a:p>
+            <a:pPr marL="30162" indent="0">
+              <a:buNone/>
+            </a:pPr>
+            <a:r>
+              <a:rPr lang="en-GB" dirty="0"/>
+              <a:t>Objectives:</a:t>
+            </a:r>
+          </a:p>
+          <a:p>
+            <a:pPr>
+              <a:buFont typeface="Arial" panose="020B0604020202020204" pitchFamily="34" charset="0"/>
+              <a:buChar char="•"/>
+            </a:pPr>
+            <a:r>
+              <a:rPr lang="en-GB" dirty="0"/>
+              <a:t>Warn road users</a:t>
+            </a:r>
+          </a:p>
+          <a:p>
+            <a:pPr lvl="1">
+              <a:buFont typeface="Arial" panose="020B0604020202020204" pitchFamily="34" charset="0"/>
+              <a:buChar char="•"/>
+            </a:pPr>
+            <a:r>
+              <a:rPr lang="en-GB" dirty="0"/>
+              <a:t>Weather events</a:t>
+            </a:r>
+          </a:p>
+          <a:p>
+            <a:pPr lvl="1">
+              <a:buFont typeface="Arial" panose="020B0604020202020204" pitchFamily="34" charset="0"/>
+              <a:buChar char="•"/>
+            </a:pPr>
+            <a:r>
+              <a:rPr lang="en-GB" dirty="0"/>
+              <a:t>Road events</a:t>
+            </a:r>
+          </a:p>
+          <a:p>
+            <a:pPr>
+              <a:buFont typeface="Arial" panose="020B0604020202020204" pitchFamily="34" charset="0"/>
+              <a:buChar char="•"/>
+            </a:pPr>
+            <a:r>
+              <a:rPr lang="en-GB" dirty="0"/>
+              <a:t>Directly involve VRUs</a:t>
+            </a:r>
+          </a:p>
+          <a:p>
+            <a:pPr lvl="1">
+              <a:buFont typeface="Arial" panose="020B0604020202020204" pitchFamily="34" charset="0"/>
+              <a:buChar char="•"/>
+            </a:pPr>
+            <a:r>
+              <a:rPr lang="en-GB" dirty="0"/>
+              <a:t>Location sharing</a:t>
+            </a:r>
+          </a:p>
+          <a:p>
+            <a:pPr lvl="1">
+              <a:buFont typeface="Arial" panose="020B0604020202020204" pitchFamily="34" charset="0"/>
+              <a:buChar char="•"/>
+            </a:pPr>
+            <a:r>
+              <a:rPr lang="en-GB" dirty="0"/>
+              <a:t>Report of events</a:t>
+            </a:r>
+          </a:p>
+          <a:p>
+            <a:pPr>
+              <a:buFont typeface="Arial" panose="020B0604020202020204" pitchFamily="34" charset="0"/>
+              <a:buChar char="•"/>
+            </a:pPr>
+            <a:r>
+              <a:rPr lang="en-GB" dirty="0"/>
+              <a:t>Traffic Control Centre monitoring</a:t>
+            </a:r>
+          </a:p>
+          <a:p>
+            <a:pPr>
+              <a:buFont typeface="Arial" panose="020B0604020202020204" pitchFamily="34" charset="0"/>
+              <a:buChar char="•"/>
+            </a:pPr>
+            <a:r>
+              <a:rPr lang="en-GB" dirty="0"/>
+              <a:t>Vehicular communications</a:t>
+            </a:r>
+          </a:p>
+          <a:p>
+            <a:pPr lvl="1">
+              <a:buFont typeface="Arial" panose="020B0604020202020204" pitchFamily="34" charset="0"/>
+              <a:buChar char="•"/>
+            </a:pPr>
+            <a:r>
+              <a:rPr lang="en-GB" dirty="0"/>
+              <a:t>Sensors sharing</a:t>
+            </a:r>
+          </a:p>
+          <a:p>
+            <a:pPr lvl="1">
+              <a:buFont typeface="Arial" panose="020B0604020202020204" pitchFamily="34" charset="0"/>
+              <a:buChar char="•"/>
+            </a:pPr>
+            <a:r>
+              <a:rPr lang="en-GB" dirty="0"/>
+              <a:t>Tolling</a:t>
+            </a:r>
+          </a:p>
+          <a:p>
+            <a:pPr lvl="1">
+              <a:buFont typeface="Arial" panose="020B0604020202020204" pitchFamily="34" charset="0"/>
+              <a:buChar char="•"/>
+            </a:pPr>
+            <a:r>
+              <a:rPr lang="en-GB" dirty="0"/>
+              <a:t>EV charging</a:t>
+            </a:r>
+          </a:p>
+        </p:txBody>
+      </p:sp>
+      <p:sp>
+        <p:nvSpPr>
+          <p:cNvPr id="4" name="Slide Number Placeholder 3">
+            <a:extLst>
+              <a:ext uri="{FF2B5EF4-FFF2-40B4-BE49-F238E27FC236}">
+                <a16:creationId xmlns:a16="http://schemas.microsoft.com/office/drawing/2014/main" id="{E75C941D-C027-D5E4-67C7-6A26EEBA2425}"/>
+              </a:ext>
+            </a:extLst>
+          </p:cNvPr>
+          <p:cNvSpPr>
+            <a:spLocks noGrp="1"/>
+          </p:cNvSpPr>
+          <p:nvPr>
+            <p:ph type="sldNum" sz="quarter" idx="10"/>
+          </p:nvPr>
+        </p:nvSpPr>
+        <p:spPr/>
+        <p:txBody>
+          <a:bodyPr/>
+          <a:lstStyle/>
+          <a:p>
+            <a:pPr>
+              <a:defRPr/>
+            </a:pPr>
+            <a:fld id="{EF60A818-680D-8044-B769-B122DF9C5B6D}" type="slidenum">
+              <a:rPr lang="en-US" smtClean="0"/>
+              <a:pPr>
+                <a:defRPr/>
+              </a:pPr>
+              <a:t>3</a:t>
+            </a:fld>
+            <a:endParaRPr lang="en-US" dirty="0"/>
+          </a:p>
+        </p:txBody>
+      </p:sp>
+      <p:sp>
+        <p:nvSpPr>
+          <p:cNvPr id="5" name="Footer Placeholder 4">
+            <a:extLst>
+              <a:ext uri="{FF2B5EF4-FFF2-40B4-BE49-F238E27FC236}">
+                <a16:creationId xmlns:a16="http://schemas.microsoft.com/office/drawing/2014/main" id="{E4C4D936-66AD-B414-9EB2-480ABF0808CE}"/>
+              </a:ext>
+            </a:extLst>
+          </p:cNvPr>
+          <p:cNvSpPr>
+            <a:spLocks noGrp="1"/>
+          </p:cNvSpPr>
+          <p:nvPr>
+            <p:ph type="ftr" sz="quarter" idx="11"/>
+          </p:nvPr>
+        </p:nvSpPr>
+        <p:spPr/>
+        <p:txBody>
+          <a:bodyPr/>
+          <a:lstStyle/>
+          <a:p>
+            <a:pPr>
+              <a:defRPr/>
+            </a:pPr>
+            <a:r>
+              <a:rPr lang="en-US"/>
+              <a:t>DETI / MEI / PDE / 2022-23</a:t>
+            </a:r>
+          </a:p>
+        </p:txBody>
+      </p:sp>
+      <p:grpSp>
+        <p:nvGrpSpPr>
+          <p:cNvPr id="16" name="Group 15">
+            <a:extLst>
+              <a:ext uri="{FF2B5EF4-FFF2-40B4-BE49-F238E27FC236}">
+                <a16:creationId xmlns:a16="http://schemas.microsoft.com/office/drawing/2014/main" id="{BA789E7F-0006-764C-40B4-E2AD424E96CD}"/>
+              </a:ext>
+            </a:extLst>
+          </p:cNvPr>
+          <p:cNvGrpSpPr/>
+          <p:nvPr/>
+        </p:nvGrpSpPr>
+        <p:grpSpPr>
+          <a:xfrm>
+            <a:off x="7664451" y="1654175"/>
+            <a:ext cx="5114925" cy="4300538"/>
+            <a:chOff x="7629527" y="1196975"/>
+            <a:chExt cx="5114925" cy="4300538"/>
+          </a:xfrm>
+        </p:grpSpPr>
+        <p:sp>
+          <p:nvSpPr>
+            <p:cNvPr id="12" name="Content Placeholder 2">
+              <a:extLst>
+                <a:ext uri="{FF2B5EF4-FFF2-40B4-BE49-F238E27FC236}">
+                  <a16:creationId xmlns:a16="http://schemas.microsoft.com/office/drawing/2014/main" id="{A780B2D3-2F61-1150-FA50-64B9A4A52C63}"/>
+                </a:ext>
+              </a:extLst>
+            </p:cNvPr>
+            <p:cNvSpPr txBox="1">
+              <a:spLocks/>
+            </p:cNvSpPr>
+            <p:nvPr/>
+          </p:nvSpPr>
+          <p:spPr bwMode="auto">
+            <a:xfrm>
+              <a:off x="7629527" y="3350023"/>
+              <a:ext cx="5114925" cy="2147490"/>
+            </a:xfrm>
+            <a:prstGeom prst="rect">
+              <a:avLst/>
+            </a:prstGeom>
+            <a:noFill/>
+            <a:ln>
+              <a:noFill/>
+            </a:ln>
+            <a:extLst>
+              <a:ext uri="{FAA26D3D-D897-4be2-8F04-BA451C77F1D7}">
+                <ma14:placeholderFlag xmlns="" xmlns:ma14="http://schemas.microsoft.com/office/mac/drawingml/2011/main" val="1"/>
+              </a:ext>
+              <a:ext uri="{909E8E84-426E-40dd-AFC4-6F175D3DCCD1}">
+                <a14:hiddenFill xmlns="" xmlns:a14="http://schemas.microsoft.com/office/drawing/2010/main">
+                  <a:solidFill>
+                    <a:srgbClr val="FFFFFF"/>
+                  </a:solidFill>
+                </a14:hiddenFill>
+              </a:ext>
+              <a:ext uri="{91240B29-F687-4f45-9708-019B960494DF}">
+                <a14:hiddenLine xmlns="" xmlns:a14="http://schemas.microsoft.com/office/drawing/2010/main" w="9525">
+                  <a:solidFill>
+                    <a:srgbClr val="000000"/>
+                  </a:solidFill>
+                  <a:miter lim="800000"/>
+                  <a:headEnd/>
+                  <a:tailEnd/>
+                </a14:hiddenLine>
+              </a:ext>
+            </a:extLst>
+          </p:spPr>
+          <p:txBody>
+            <a:bodyPr vert="horz" wrap="square" lIns="91440" tIns="45720" rIns="91440" bIns="45720" numCol="1" anchor="t" anchorCtr="0" compatLnSpc="1">
+              <a:prstTxWarp prst="textNoShape">
+                <a:avLst/>
+              </a:prstTxWarp>
+            </a:bodyPr>
+            <a:lstStyle>
+              <a:lvl1pPr marL="365125" indent="-334963" algn="l" rtl="0" fontAlgn="base">
+                <a:spcBef>
+                  <a:spcPct val="20000"/>
+                </a:spcBef>
+                <a:spcAft>
+                  <a:spcPct val="0"/>
+                </a:spcAft>
+                <a:buClr>
+                  <a:srgbClr val="339933"/>
+                </a:buClr>
+                <a:buSzPct val="100000"/>
+                <a:buFont typeface="Wingdings" pitchFamily="2" charset="2"/>
+                <a:buChar char="v"/>
+                <a:tabLst/>
+                <a:defRPr sz="2400" kern="1200">
+                  <a:solidFill>
+                    <a:schemeClr val="accent1">
+                      <a:lumMod val="50000"/>
+                    </a:schemeClr>
+                  </a:solidFill>
+                  <a:latin typeface="Helvetica Neue" panose="02000503000000020004" pitchFamily="2" charset="0"/>
+                  <a:ea typeface="Helvetica Neue" panose="02000503000000020004" pitchFamily="2" charset="0"/>
+                  <a:cs typeface="Helvetica Neue" panose="02000503000000020004" pitchFamily="2" charset="0"/>
+                </a:defRPr>
+              </a:lvl1pPr>
+              <a:lvl2pPr marL="742950" indent="-285750" algn="l" rtl="0" fontAlgn="base">
+                <a:spcBef>
+                  <a:spcPct val="20000"/>
+                </a:spcBef>
+                <a:spcAft>
+                  <a:spcPct val="0"/>
+                </a:spcAft>
+                <a:buFont typeface="Wingdings" pitchFamily="2" charset="2"/>
+                <a:buChar char="§"/>
+                <a:defRPr sz="2000" kern="1200">
+                  <a:solidFill>
+                    <a:schemeClr val="accent1">
+                      <a:lumMod val="50000"/>
+                    </a:schemeClr>
+                  </a:solidFill>
+                  <a:latin typeface="Helvetica Neue" panose="02000503000000020004" pitchFamily="2" charset="0"/>
+                  <a:ea typeface="Helvetica Neue" panose="02000503000000020004" pitchFamily="2" charset="0"/>
+                  <a:cs typeface="Helvetica Neue" panose="02000503000000020004" pitchFamily="2" charset="0"/>
+                </a:defRPr>
+              </a:lvl2pPr>
+              <a:lvl3pPr marL="981075" indent="-188913" algn="l" rtl="0" fontAlgn="base">
+                <a:spcBef>
+                  <a:spcPct val="20000"/>
+                </a:spcBef>
+                <a:spcAft>
+                  <a:spcPct val="0"/>
+                </a:spcAft>
+                <a:buFont typeface="Arial"/>
+                <a:buChar char="•"/>
+                <a:tabLst>
+                  <a:tab pos="355600" algn="l"/>
+                  <a:tab pos="812800" algn="l"/>
+                  <a:tab pos="1168400" algn="l"/>
+                  <a:tab pos="1524000" algn="l"/>
+                  <a:tab pos="1879600" algn="l"/>
+                  <a:tab pos="2247900" algn="l"/>
+                </a:tabLst>
+                <a:defRPr sz="1600" kern="1200">
+                  <a:solidFill>
+                    <a:schemeClr val="accent1">
+                      <a:lumMod val="50000"/>
+                    </a:schemeClr>
+                  </a:solidFill>
+                  <a:latin typeface="Helvetica Neue" panose="02000503000000020004" pitchFamily="2" charset="0"/>
+                  <a:ea typeface="Helvetica Neue" panose="02000503000000020004" pitchFamily="2" charset="0"/>
+                  <a:cs typeface="Helvetica Neue" panose="02000503000000020004" pitchFamily="2" charset="0"/>
+                </a:defRPr>
+              </a:lvl3pPr>
+              <a:lvl4pPr marL="357188" algn="l" rtl="0" fontAlgn="base">
+                <a:spcBef>
+                  <a:spcPct val="20000"/>
+                </a:spcBef>
+                <a:spcAft>
+                  <a:spcPct val="0"/>
+                </a:spcAft>
+                <a:buFont typeface="Arial" charset="0"/>
+                <a:tabLst>
+                  <a:tab pos="623888" algn="l"/>
+                  <a:tab pos="901700" algn="l"/>
+                  <a:tab pos="1258888" algn="l"/>
+                  <a:tab pos="1616075" algn="l"/>
+                  <a:tab pos="1971675" algn="l"/>
+                  <a:tab pos="2328863" algn="l"/>
+                </a:tabLst>
+                <a:defRPr sz="1400" b="1" kern="1200">
+                  <a:solidFill>
+                    <a:srgbClr val="0000FF"/>
+                  </a:solidFill>
+                  <a:latin typeface="Monaco"/>
+                  <a:ea typeface="ＭＳ Ｐゴシック" charset="0"/>
+                  <a:cs typeface="Monaco"/>
+                </a:defRPr>
+              </a:lvl4pPr>
+              <a:lvl5pPr marL="2057400" indent="-228600" algn="l" rtl="0" fontAlgn="base">
+                <a:spcBef>
+                  <a:spcPct val="20000"/>
+                </a:spcBef>
+                <a:spcAft>
+                  <a:spcPct val="0"/>
+                </a:spcAft>
+                <a:buFont typeface="Arial" charset="0"/>
+                <a:buChar char="»"/>
+                <a:defRPr sz="1400" kern="1200">
+                  <a:solidFill>
+                    <a:schemeClr val="accent1">
+                      <a:lumMod val="50000"/>
+                    </a:schemeClr>
+                  </a:solidFill>
+                  <a:latin typeface="Century Gothic" panose="020B0502020202020204" pitchFamily="34" charset="0"/>
+                  <a:ea typeface="Gill Sans" charset="0"/>
+                  <a:cs typeface="Arial" panose="020B0604020202020204" pitchFamily="34" charset="0"/>
+                </a:defRPr>
+              </a:lvl5pPr>
+              <a:lvl6pPr marL="2514600" indent="-228600" algn="l" defTabSz="914400" rtl="0" eaLnBrk="1" latinLnBrk="0" hangingPunct="1">
+                <a:spcBef>
+                  <a:spcPct val="20000"/>
+                </a:spcBef>
+                <a:buFont typeface="Arial" pitchFamily="34" charset="0"/>
+                <a:buChar char="•"/>
+                <a:defRPr sz="2000" kern="1200">
+                  <a:solidFill>
+                    <a:schemeClr val="tx1"/>
+                  </a:solidFill>
+                  <a:latin typeface="+mn-lt"/>
+                  <a:ea typeface="+mn-ea"/>
+                  <a:cs typeface="+mn-cs"/>
+                </a:defRPr>
+              </a:lvl6pPr>
+              <a:lvl7pPr marL="2971800" indent="-228600" algn="l" defTabSz="914400" rtl="0" eaLnBrk="1" latinLnBrk="0" hangingPunct="1">
+                <a:spcBef>
+                  <a:spcPct val="20000"/>
+                </a:spcBef>
+                <a:buFont typeface="Arial" pitchFamily="34" charset="0"/>
+                <a:buChar char="•"/>
+                <a:defRPr sz="2000" kern="1200">
+                  <a:solidFill>
+                    <a:schemeClr val="tx1"/>
+                  </a:solidFill>
+                  <a:latin typeface="+mn-lt"/>
+                  <a:ea typeface="+mn-ea"/>
+                  <a:cs typeface="+mn-cs"/>
+                </a:defRPr>
+              </a:lvl7pPr>
+              <a:lvl8pPr marL="3429000" indent="-228600" algn="l" defTabSz="914400" rtl="0" eaLnBrk="1" latinLnBrk="0" hangingPunct="1">
+                <a:spcBef>
+                  <a:spcPct val="20000"/>
+                </a:spcBef>
+                <a:buFont typeface="Arial" pitchFamily="34" charset="0"/>
+                <a:buChar char="•"/>
+                <a:defRPr sz="2000" kern="1200">
+                  <a:solidFill>
+                    <a:schemeClr val="tx1"/>
+                  </a:solidFill>
+                  <a:latin typeface="+mn-lt"/>
+                  <a:ea typeface="+mn-ea"/>
+                  <a:cs typeface="+mn-cs"/>
+                </a:defRPr>
+              </a:lvl8pPr>
+              <a:lvl9pPr marL="3886200" indent="-228600" algn="l" defTabSz="914400" rtl="0" eaLnBrk="1" latinLnBrk="0" hangingPunct="1">
+                <a:spcBef>
+                  <a:spcPct val="20000"/>
+                </a:spcBef>
+                <a:buFont typeface="Arial" pitchFamily="34" charset="0"/>
+                <a:buChar char="•"/>
+                <a:defRPr sz="2000" kern="1200">
+                  <a:solidFill>
+                    <a:schemeClr val="tx1"/>
+                  </a:solidFill>
+                  <a:latin typeface="+mn-lt"/>
+                  <a:ea typeface="+mn-ea"/>
+                  <a:cs typeface="+mn-cs"/>
+                </a:defRPr>
+              </a:lvl9pPr>
+            </a:lstStyle>
+            <a:p>
+              <a:pPr marL="30162" indent="0">
+                <a:buFont typeface="Wingdings" pitchFamily="2" charset="2"/>
+                <a:buNone/>
+              </a:pPr>
+              <a:r>
+                <a:rPr lang="en-GB" dirty="0"/>
+                <a:t>User Modes:</a:t>
+              </a:r>
+            </a:p>
+            <a:p>
+              <a:pPr>
+                <a:buFont typeface="Arial" panose="020B0604020202020204" pitchFamily="34" charset="0"/>
+                <a:buChar char="•"/>
+              </a:pPr>
+              <a:r>
+                <a:rPr lang="en-GB" dirty="0"/>
+                <a:t>VRU mode (left)</a:t>
+              </a:r>
+            </a:p>
+            <a:p>
+              <a:pPr>
+                <a:buFont typeface="Arial" panose="020B0604020202020204" pitchFamily="34" charset="0"/>
+                <a:buChar char="•"/>
+              </a:pPr>
+              <a:r>
+                <a:rPr lang="en-GB" dirty="0"/>
+                <a:t>TCC mode (centre)</a:t>
+              </a:r>
+            </a:p>
+            <a:p>
+              <a:pPr>
+                <a:buFont typeface="Arial" panose="020B0604020202020204" pitchFamily="34" charset="0"/>
+                <a:buChar char="•"/>
+              </a:pPr>
+              <a:r>
+                <a:rPr lang="en-GB" dirty="0"/>
+                <a:t>OBU mode (right)</a:t>
+              </a:r>
+            </a:p>
+          </p:txBody>
+        </p:sp>
+        <p:grpSp>
+          <p:nvGrpSpPr>
+            <p:cNvPr id="14" name="Group 13">
+              <a:extLst>
+                <a:ext uri="{FF2B5EF4-FFF2-40B4-BE49-F238E27FC236}">
+                  <a16:creationId xmlns:a16="http://schemas.microsoft.com/office/drawing/2014/main" id="{86AD642A-A204-4642-A38D-6CBD60B797ED}"/>
+                </a:ext>
+              </a:extLst>
+            </p:cNvPr>
+            <p:cNvGrpSpPr/>
+            <p:nvPr/>
+          </p:nvGrpSpPr>
+          <p:grpSpPr>
+            <a:xfrm>
+              <a:off x="7629527" y="1196975"/>
+              <a:ext cx="2990850" cy="1627434"/>
+              <a:chOff x="6248400" y="3441699"/>
+              <a:chExt cx="2990850" cy="1627434"/>
+            </a:xfrm>
+          </p:grpSpPr>
+          <p:pic>
+            <p:nvPicPr>
+              <p:cNvPr id="11" name="Picture 10" descr="Icon&#10;&#10;Description automatically generated">
+                <a:extLst>
+                  <a:ext uri="{FF2B5EF4-FFF2-40B4-BE49-F238E27FC236}">
+                    <a16:creationId xmlns:a16="http://schemas.microsoft.com/office/drawing/2014/main" id="{7D44FDCE-6E4C-3D18-9F5E-6F824B99ADB8}"/>
+                  </a:ext>
+                </a:extLst>
+              </p:cNvPr>
+              <p:cNvPicPr>
+                <a:picLocks noChangeAspect="1"/>
+              </p:cNvPicPr>
+              <p:nvPr/>
+            </p:nvPicPr>
+            <p:blipFill>
+              <a:blip r:embed="rId2">
+                <a:extLst>
+                  <a:ext uri="{28A0092B-C50C-407E-A947-70E740481C1C}">
+                    <a14:useLocalDpi xmlns:a14="http://schemas.microsoft.com/office/drawing/2010/main" val="0"/>
+                  </a:ext>
+                </a:extLst>
+              </a:blip>
+              <a:stretch>
+                <a:fillRect/>
+              </a:stretch>
+            </p:blipFill>
+            <p:spPr>
+              <a:xfrm>
+                <a:off x="6248400" y="3441699"/>
+                <a:ext cx="2990850" cy="1295400"/>
+              </a:xfrm>
+              <a:prstGeom prst="rect">
+                <a:avLst/>
+              </a:prstGeom>
+            </p:spPr>
+          </p:pic>
+          <p:sp>
+            <p:nvSpPr>
+              <p:cNvPr id="13" name="TextBox 12">
+                <a:extLst>
+                  <a:ext uri="{FF2B5EF4-FFF2-40B4-BE49-F238E27FC236}">
+                    <a16:creationId xmlns:a16="http://schemas.microsoft.com/office/drawing/2014/main" id="{59A050A1-09D4-6395-0AD6-1879CC713DD2}"/>
+                  </a:ext>
+                </a:extLst>
+              </p:cNvPr>
+              <p:cNvSpPr txBox="1"/>
+              <p:nvPr/>
+            </p:nvSpPr>
+            <p:spPr>
+              <a:xfrm>
+                <a:off x="6427599" y="4607468"/>
+                <a:ext cx="2632452" cy="461665"/>
+              </a:xfrm>
+              <a:prstGeom prst="rect">
+                <a:avLst/>
+              </a:prstGeom>
+              <a:noFill/>
+            </p:spPr>
+            <p:txBody>
+              <a:bodyPr wrap="none" rtlCol="0">
+                <a:spAutoFit/>
+              </a:bodyPr>
+              <a:lstStyle/>
+              <a:p>
+                <a:r>
+                  <a:rPr lang="en-GB" dirty="0"/>
+                  <a:t>User mode switch</a:t>
+                </a:r>
+              </a:p>
+            </p:txBody>
+          </p:sp>
+        </p:grpSp>
+      </p:grpSp>
+    </p:spTree>
+    <p:extLst>
+      <p:ext uri="{BB962C8B-B14F-4D97-AF65-F5344CB8AC3E}">
+        <p14:creationId xmlns:p14="http://schemas.microsoft.com/office/powerpoint/2010/main" val="217442507"/>
+      </p:ext>
+    </p:extLst>
+  </p:cSld>
+  <p:clrMapOvr>
+    <a:masterClrMapping/>
+  </p:clrMapOvr>
+</p:sld>
+</file>
+
+<file path=ppt/slides/slide4.xml><?xml version="1.0" encoding="utf-8"?>
+<p:sld xmlns:a="http://schemas.openxmlformats.org/drawingml/2006/main" xmlns:r="http://schemas.openxmlformats.org/officeDocument/2006/relationships" xmlns:p="http://schemas.openxmlformats.org/presentationml/2006/main">
+  <p:cSld>
+    <p:spTree>
+      <p:nvGrpSpPr>
+        <p:cNvPr id="1" name=""/>
+        <p:cNvGrpSpPr/>
+        <p:nvPr/>
+      </p:nvGrpSpPr>
+      <p:grpSpPr>
+        <a:xfrm>
+          <a:off x="0" y="0"/>
+          <a:ext cx="0" cy="0"/>
+          <a:chOff x="0" y="0"/>
+          <a:chExt cx="0" cy="0"/>
+        </a:xfrm>
+      </p:grpSpPr>
+      <p:sp>
+        <p:nvSpPr>
+          <p:cNvPr id="2" name="Title 1">
+            <a:extLst>
+              <a:ext uri="{FF2B5EF4-FFF2-40B4-BE49-F238E27FC236}">
+                <a16:creationId xmlns:a16="http://schemas.microsoft.com/office/drawing/2014/main" id="{AF520886-C674-C8FB-C8D9-E159C0C3E004}"/>
+              </a:ext>
+            </a:extLst>
+          </p:cNvPr>
+          <p:cNvSpPr>
+            <a:spLocks noGrp="1"/>
+          </p:cNvSpPr>
+          <p:nvPr>
+            <p:ph type="title"/>
+          </p:nvPr>
+        </p:nvSpPr>
+        <p:spPr/>
+        <p:txBody>
+          <a:bodyPr/>
+          <a:lstStyle/>
+          <a:p>
+            <a:r>
+              <a:rPr lang="pt-PT" dirty="0" err="1"/>
+              <a:t>Message</a:t>
+            </a:r>
+            <a:r>
+              <a:rPr lang="pt-PT" dirty="0"/>
+              <a:t> </a:t>
+            </a:r>
+            <a:r>
+              <a:rPr lang="pt-PT" dirty="0" err="1"/>
+              <a:t>Queuing</a:t>
+            </a:r>
+            <a:r>
+              <a:rPr lang="pt-PT" dirty="0"/>
+              <a:t> </a:t>
+            </a:r>
+            <a:r>
+              <a:rPr lang="pt-PT" dirty="0" err="1"/>
+              <a:t>Telemetry</a:t>
+            </a:r>
+            <a:r>
+              <a:rPr lang="pt-PT" dirty="0"/>
+              <a:t> </a:t>
+            </a:r>
+            <a:r>
+              <a:rPr lang="pt-PT" dirty="0" err="1"/>
+              <a:t>Transport</a:t>
+            </a:r>
+            <a:r>
+              <a:rPr lang="pt-PT" dirty="0"/>
+              <a:t> </a:t>
+            </a:r>
+            <a:endParaRPr lang="en-GB" dirty="0"/>
+          </a:p>
+        </p:txBody>
+      </p:sp>
+      <p:sp>
+        <p:nvSpPr>
+          <p:cNvPr id="3" name="Content Placeholder 2">
+            <a:extLst>
+              <a:ext uri="{FF2B5EF4-FFF2-40B4-BE49-F238E27FC236}">
+                <a16:creationId xmlns:a16="http://schemas.microsoft.com/office/drawing/2014/main" id="{F2236919-7603-A129-7B4F-9E12C1AB64A8}"/>
+              </a:ext>
+            </a:extLst>
+          </p:cNvPr>
+          <p:cNvSpPr>
+            <a:spLocks noGrp="1"/>
+          </p:cNvSpPr>
+          <p:nvPr>
+            <p:ph idx="1"/>
+          </p:nvPr>
+        </p:nvSpPr>
+        <p:spPr/>
+        <p:txBody>
+          <a:bodyPr/>
+          <a:lstStyle/>
+          <a:p>
+            <a:pPr marL="30162" indent="0">
+              <a:buNone/>
+            </a:pPr>
+            <a:r>
+              <a:rPr lang="pt-PT" dirty="0" err="1"/>
+              <a:t>All</a:t>
+            </a:r>
+            <a:r>
+              <a:rPr lang="pt-PT" dirty="0"/>
+              <a:t> </a:t>
+            </a:r>
+            <a:r>
+              <a:rPr lang="pt-PT" dirty="0" err="1"/>
+              <a:t>information</a:t>
+            </a:r>
+            <a:r>
+              <a:rPr lang="pt-PT" dirty="0"/>
+              <a:t> </a:t>
+            </a:r>
+            <a:r>
+              <a:rPr lang="pt-PT" dirty="0" err="1"/>
+              <a:t>is</a:t>
+            </a:r>
+            <a:r>
+              <a:rPr lang="pt-PT" dirty="0"/>
+              <a:t> </a:t>
+            </a:r>
+            <a:r>
+              <a:rPr lang="pt-PT" dirty="0" err="1"/>
+              <a:t>exchanged</a:t>
+            </a:r>
+            <a:r>
+              <a:rPr lang="pt-PT" dirty="0"/>
+              <a:t> </a:t>
+            </a:r>
+            <a:r>
+              <a:rPr lang="pt-PT" dirty="0" err="1"/>
+              <a:t>using</a:t>
+            </a:r>
+            <a:r>
+              <a:rPr lang="pt-PT" dirty="0"/>
+              <a:t> </a:t>
+            </a:r>
+            <a:r>
+              <a:rPr lang="pt-PT" dirty="0" err="1"/>
+              <a:t>an</a:t>
+            </a:r>
+            <a:r>
+              <a:rPr lang="pt-PT" dirty="0"/>
+              <a:t> MQTT broker.</a:t>
+            </a:r>
+          </a:p>
+          <a:p>
+            <a:pPr marL="30162" indent="0">
+              <a:buNone/>
+            </a:pPr>
+            <a:r>
+              <a:rPr lang="pt-PT" dirty="0" err="1"/>
+              <a:t>Lightweight</a:t>
+            </a:r>
+            <a:r>
+              <a:rPr lang="pt-PT" dirty="0"/>
+              <a:t> </a:t>
+            </a:r>
+            <a:r>
+              <a:rPr lang="pt-PT" dirty="0" err="1"/>
+              <a:t>protocol</a:t>
+            </a:r>
+            <a:r>
+              <a:rPr lang="pt-PT" dirty="0"/>
+              <a:t> </a:t>
+            </a:r>
+            <a:r>
+              <a:rPr lang="pt-PT" dirty="0" err="1"/>
+              <a:t>with</a:t>
+            </a:r>
+            <a:r>
+              <a:rPr lang="pt-PT" dirty="0"/>
+              <a:t> a </a:t>
+            </a:r>
+            <a:r>
+              <a:rPr lang="pt-PT" dirty="0" err="1"/>
+              <a:t>publish</a:t>
+            </a:r>
+            <a:r>
+              <a:rPr lang="pt-PT" dirty="0"/>
+              <a:t>/</a:t>
+            </a:r>
+            <a:r>
+              <a:rPr lang="pt-PT" dirty="0" err="1"/>
+              <a:t>subscribe</a:t>
+            </a:r>
+            <a:r>
+              <a:rPr lang="pt-PT" dirty="0"/>
+              <a:t> </a:t>
+            </a:r>
+            <a:r>
+              <a:rPr lang="pt-PT" dirty="0" err="1"/>
+              <a:t>model</a:t>
+            </a:r>
+            <a:r>
+              <a:rPr lang="pt-PT" dirty="0"/>
+              <a:t>.</a:t>
+            </a:r>
+          </a:p>
+          <a:p>
+            <a:pPr marL="30162" indent="0">
+              <a:buNone/>
+            </a:pPr>
+            <a:endParaRPr lang="en-GB" dirty="0"/>
+          </a:p>
+          <a:p>
+            <a:pPr marL="30162" indent="0">
+              <a:buNone/>
+            </a:pPr>
+            <a:r>
+              <a:rPr lang="en-GB" dirty="0"/>
+              <a:t>Topic structure and quadtree allows for a user to subscribe only to it’s nearby messages!</a:t>
+            </a:r>
+          </a:p>
+          <a:p>
+            <a:pPr marL="30162" indent="0">
+              <a:buNone/>
+            </a:pPr>
+            <a:endParaRPr lang="en-GB" dirty="0"/>
+          </a:p>
+        </p:txBody>
+      </p:sp>
+      <p:sp>
+        <p:nvSpPr>
+          <p:cNvPr id="4" name="Slide Number Placeholder 3">
+            <a:extLst>
+              <a:ext uri="{FF2B5EF4-FFF2-40B4-BE49-F238E27FC236}">
+                <a16:creationId xmlns:a16="http://schemas.microsoft.com/office/drawing/2014/main" id="{797EB5EF-E501-117B-FC2B-CCCF67AC249F}"/>
+              </a:ext>
+            </a:extLst>
+          </p:cNvPr>
+          <p:cNvSpPr>
+            <a:spLocks noGrp="1"/>
+          </p:cNvSpPr>
+          <p:nvPr>
+            <p:ph type="sldNum" sz="quarter" idx="10"/>
+          </p:nvPr>
+        </p:nvSpPr>
+        <p:spPr/>
+        <p:txBody>
+          <a:bodyPr/>
+          <a:lstStyle/>
+          <a:p>
+            <a:pPr>
+              <a:defRPr/>
+            </a:pPr>
+            <a:fld id="{EF60A818-680D-8044-B769-B122DF9C5B6D}" type="slidenum">
+              <a:rPr lang="en-US" smtClean="0"/>
+              <a:pPr>
+                <a:defRPr/>
+              </a:pPr>
+              <a:t>4</a:t>
+            </a:fld>
+            <a:endParaRPr lang="en-US" dirty="0"/>
+          </a:p>
+        </p:txBody>
+      </p:sp>
+      <p:sp>
+        <p:nvSpPr>
+          <p:cNvPr id="5" name="Footer Placeholder 4">
+            <a:extLst>
+              <a:ext uri="{FF2B5EF4-FFF2-40B4-BE49-F238E27FC236}">
+                <a16:creationId xmlns:a16="http://schemas.microsoft.com/office/drawing/2014/main" id="{EE4B6189-09DB-A8F6-DB5D-F76BA56CF342}"/>
+              </a:ext>
+            </a:extLst>
+          </p:cNvPr>
+          <p:cNvSpPr>
+            <a:spLocks noGrp="1"/>
+          </p:cNvSpPr>
+          <p:nvPr>
+            <p:ph type="ftr" sz="quarter" idx="11"/>
+          </p:nvPr>
+        </p:nvSpPr>
+        <p:spPr/>
+        <p:txBody>
+          <a:bodyPr/>
+          <a:lstStyle/>
+          <a:p>
+            <a:pPr>
+              <a:defRPr/>
+            </a:pPr>
+            <a:r>
+              <a:rPr lang="en-US"/>
+              <a:t>DETI / MEI / PDE / 2022-23</a:t>
+            </a:r>
+          </a:p>
+        </p:txBody>
+      </p:sp>
+      <p:pic>
+        <p:nvPicPr>
+          <p:cNvPr id="7" name="Picture 6">
+            <a:extLst>
+              <a:ext uri="{FF2B5EF4-FFF2-40B4-BE49-F238E27FC236}">
+                <a16:creationId xmlns:a16="http://schemas.microsoft.com/office/drawing/2014/main" id="{8BD11AE0-E07E-A635-996F-E4624DF15782}"/>
+              </a:ext>
+            </a:extLst>
+          </p:cNvPr>
+          <p:cNvPicPr>
+            <a:picLocks noChangeAspect="1"/>
+          </p:cNvPicPr>
+          <p:nvPr/>
+        </p:nvPicPr>
+        <p:blipFill>
+          <a:blip r:embed="rId2">
+            <a:extLst>
+              <a:ext uri="{28A0092B-C50C-407E-A947-70E740481C1C}">
+                <a14:useLocalDpi xmlns:a14="http://schemas.microsoft.com/office/drawing/2010/main" val="0"/>
+              </a:ext>
+            </a:extLst>
+          </a:blip>
+          <a:stretch>
+            <a:fillRect/>
+          </a:stretch>
+        </p:blipFill>
+        <p:spPr>
+          <a:xfrm>
+            <a:off x="4105275" y="2158489"/>
+            <a:ext cx="4876800" cy="323850"/>
+          </a:xfrm>
+          <a:prstGeom prst="rect">
+            <a:avLst/>
+          </a:prstGeom>
+        </p:spPr>
+      </p:pic>
+      <p:pic>
+        <p:nvPicPr>
+          <p:cNvPr id="1030" name="Picture 6" descr="algorithm - Adjacent cells in QuadTree - Stack Overflow">
+            <a:extLst>
+              <a:ext uri="{FF2B5EF4-FFF2-40B4-BE49-F238E27FC236}">
+                <a16:creationId xmlns:a16="http://schemas.microsoft.com/office/drawing/2014/main" id="{F79FA045-CCD0-0C7A-F2C4-C445D257363B}"/>
+              </a:ext>
+            </a:extLst>
+          </p:cNvPr>
+          <p:cNvPicPr>
+            <a:picLocks noChangeAspect="1" noChangeArrowheads="1"/>
+          </p:cNvPicPr>
+          <p:nvPr/>
+        </p:nvPicPr>
+        <p:blipFill>
+          <a:blip r:embed="rId3">
+            <a:extLst>
+              <a:ext uri="{28A0092B-C50C-407E-A947-70E740481C1C}">
+                <a14:useLocalDpi xmlns:a14="http://schemas.microsoft.com/office/drawing/2010/main" val="0"/>
+              </a:ext>
+            </a:extLst>
+          </a:blip>
+          <a:srcRect/>
+          <a:stretch>
+            <a:fillRect/>
+          </a:stretch>
+        </p:blipFill>
+        <p:spPr bwMode="auto">
+          <a:xfrm>
+            <a:off x="2588189" y="3301184"/>
+            <a:ext cx="5934075" cy="3476625"/>
+          </a:xfrm>
+          <a:prstGeom prst="rect">
+            <a:avLst/>
+          </a:prstGeom>
+          <a:noFill/>
+          <a:extLst>
+            <a:ext uri="{909E8E84-426E-40DD-AFC4-6F175D3DCCD1}">
+              <a14:hiddenFill xmlns:a14="http://schemas.microsoft.com/office/drawing/2010/main">
+                <a:solidFill>
+                  <a:srgbClr val="FFFFFF"/>
+                </a:solidFill>
+              </a14:hiddenFill>
+            </a:ext>
+          </a:extLst>
+        </p:spPr>
+      </p:pic>
+    </p:spTree>
+    <p:extLst>
+      <p:ext uri="{BB962C8B-B14F-4D97-AF65-F5344CB8AC3E}">
+        <p14:creationId xmlns:p14="http://schemas.microsoft.com/office/powerpoint/2010/main" val="3702720463"/>
+      </p:ext>
+    </p:extLst>
+  </p:cSld>
+  <p:clrMapOvr>
+    <a:masterClrMapping/>
+  </p:clrMapOvr>
+</p:sld>
+</file>
+
+<file path=ppt/slides/slide5.xml><?xml version="1.0" encoding="utf-8"?>
+<p:sld xmlns:a="http://schemas.openxmlformats.org/drawingml/2006/main" xmlns:r="http://schemas.openxmlformats.org/officeDocument/2006/relationships" xmlns:p="http://schemas.openxmlformats.org/presentationml/2006/main">
+  <p:cSld>
+    <p:spTree>
+      <p:nvGrpSpPr>
+        <p:cNvPr id="1" name=""/>
+        <p:cNvGrpSpPr/>
+        <p:nvPr/>
+      </p:nvGrpSpPr>
+      <p:grpSpPr>
+        <a:xfrm>
+          <a:off x="0" y="0"/>
+          <a:ext cx="0" cy="0"/>
+          <a:chOff x="0" y="0"/>
+          <a:chExt cx="0" cy="0"/>
+        </a:xfrm>
+      </p:grpSpPr>
+      <p:sp>
+        <p:nvSpPr>
+          <p:cNvPr id="2" name="Title 1">
+            <a:extLst>
+              <a:ext uri="{FF2B5EF4-FFF2-40B4-BE49-F238E27FC236}">
+                <a16:creationId xmlns:a16="http://schemas.microsoft.com/office/drawing/2014/main" id="{FFF8FBC4-A58D-0799-B259-F5B70F905A35}"/>
+              </a:ext>
+            </a:extLst>
+          </p:cNvPr>
+          <p:cNvSpPr>
+            <a:spLocks noGrp="1"/>
+          </p:cNvSpPr>
+          <p:nvPr>
+            <p:ph type="title"/>
+          </p:nvPr>
+        </p:nvSpPr>
+        <p:spPr/>
+        <p:txBody>
+          <a:bodyPr/>
+          <a:lstStyle/>
+          <a:p>
+            <a:r>
+              <a:rPr lang="pt-PT" dirty="0"/>
+              <a:t>Mobile App </a:t>
+            </a:r>
+            <a:r>
+              <a:rPr lang="pt-PT" dirty="0" err="1"/>
+              <a:t>Development</a:t>
+            </a:r>
+            <a:endParaRPr lang="en-GB" dirty="0"/>
+          </a:p>
+        </p:txBody>
+      </p:sp>
+      <p:pic>
+        <p:nvPicPr>
+          <p:cNvPr id="7" name="Content Placeholder 6" descr="A picture containing background pattern&#10;&#10;Description automatically generated">
+            <a:extLst>
+              <a:ext uri="{FF2B5EF4-FFF2-40B4-BE49-F238E27FC236}">
+                <a16:creationId xmlns:a16="http://schemas.microsoft.com/office/drawing/2014/main" id="{EEB70044-A15B-F864-0DA2-FC188DFC6E59}"/>
+              </a:ext>
+            </a:extLst>
+          </p:cNvPr>
+          <p:cNvPicPr>
+            <a:picLocks noGrp="1" noChangeAspect="1"/>
+          </p:cNvPicPr>
+          <p:nvPr>
+            <p:ph idx="1"/>
+          </p:nvPr>
+        </p:nvPicPr>
+        <p:blipFill>
+          <a:blip r:embed="rId2" cstate="email">
+            <a:extLst>
+              <a:ext uri="{28A0092B-C50C-407E-A947-70E740481C1C}">
+                <a14:useLocalDpi xmlns:a14="http://schemas.microsoft.com/office/drawing/2010/main" val="0"/>
+              </a:ext>
+            </a:extLst>
+          </a:blip>
+          <a:stretch>
+            <a:fillRect/>
+          </a:stretch>
+        </p:blipFill>
+        <p:spPr>
+          <a:xfrm>
+            <a:off x="9185203" y="1297858"/>
+            <a:ext cx="2108273" cy="4562834"/>
+          </a:xfrm>
+        </p:spPr>
+      </p:pic>
+      <p:sp>
+        <p:nvSpPr>
+          <p:cNvPr id="4" name="Slide Number Placeholder 3">
+            <a:extLst>
+              <a:ext uri="{FF2B5EF4-FFF2-40B4-BE49-F238E27FC236}">
+                <a16:creationId xmlns:a16="http://schemas.microsoft.com/office/drawing/2014/main" id="{F4B9ED66-641F-E501-E67A-B8A52031B3C4}"/>
+              </a:ext>
+            </a:extLst>
+          </p:cNvPr>
+          <p:cNvSpPr>
+            <a:spLocks noGrp="1"/>
+          </p:cNvSpPr>
+          <p:nvPr>
+            <p:ph type="sldNum" sz="quarter" idx="10"/>
+          </p:nvPr>
+        </p:nvSpPr>
+        <p:spPr/>
+        <p:txBody>
+          <a:bodyPr/>
+          <a:lstStyle/>
+          <a:p>
+            <a:pPr>
+              <a:defRPr/>
+            </a:pPr>
+            <a:fld id="{EF60A818-680D-8044-B769-B122DF9C5B6D}" type="slidenum">
+              <a:rPr lang="en-US" smtClean="0"/>
+              <a:pPr>
+                <a:defRPr/>
+              </a:pPr>
+              <a:t>5</a:t>
+            </a:fld>
+            <a:endParaRPr lang="en-US" dirty="0"/>
+          </a:p>
+        </p:txBody>
+      </p:sp>
+      <p:sp>
+        <p:nvSpPr>
+          <p:cNvPr id="5" name="Footer Placeholder 4">
+            <a:extLst>
+              <a:ext uri="{FF2B5EF4-FFF2-40B4-BE49-F238E27FC236}">
+                <a16:creationId xmlns:a16="http://schemas.microsoft.com/office/drawing/2014/main" id="{B92D13AE-D916-7181-0FFE-039243D4FE33}"/>
+              </a:ext>
+            </a:extLst>
+          </p:cNvPr>
+          <p:cNvSpPr>
+            <a:spLocks noGrp="1"/>
+          </p:cNvSpPr>
+          <p:nvPr>
+            <p:ph type="ftr" sz="quarter" idx="11"/>
+          </p:nvPr>
+        </p:nvSpPr>
+        <p:spPr/>
+        <p:txBody>
+          <a:bodyPr/>
+          <a:lstStyle/>
+          <a:p>
+            <a:pPr>
+              <a:defRPr/>
+            </a:pPr>
+            <a:r>
+              <a:rPr lang="en-US"/>
+              <a:t>DETI / MEI / PDE / 2022-23</a:t>
+            </a:r>
+          </a:p>
+        </p:txBody>
+      </p:sp>
+      <p:sp>
+        <p:nvSpPr>
+          <p:cNvPr id="9" name="TextBox 8">
+            <a:extLst>
+              <a:ext uri="{FF2B5EF4-FFF2-40B4-BE49-F238E27FC236}">
+                <a16:creationId xmlns:a16="http://schemas.microsoft.com/office/drawing/2014/main" id="{A735C499-F781-FA91-5AA6-BA529ECA134C}"/>
+              </a:ext>
+            </a:extLst>
+          </p:cNvPr>
+          <p:cNvSpPr txBox="1"/>
+          <p:nvPr/>
+        </p:nvSpPr>
+        <p:spPr>
+          <a:xfrm>
+            <a:off x="609600" y="1297858"/>
+            <a:ext cx="7362825" cy="3046988"/>
+          </a:xfrm>
+          <a:prstGeom prst="rect">
+            <a:avLst/>
+          </a:prstGeom>
+          <a:noFill/>
+        </p:spPr>
+        <p:txBody>
+          <a:bodyPr wrap="square" rtlCol="0">
+            <a:spAutoFit/>
+          </a:bodyPr>
+          <a:lstStyle/>
+          <a:p>
+            <a:r>
+              <a:rPr lang="pt-PT" dirty="0" err="1"/>
+              <a:t>Multi-platform</a:t>
+            </a:r>
+            <a:r>
+              <a:rPr lang="pt-PT" dirty="0"/>
+              <a:t>:</a:t>
+            </a:r>
+          </a:p>
+          <a:p>
+            <a:pPr marL="342900" indent="-342900">
+              <a:buFont typeface="Arial" panose="020B0604020202020204" pitchFamily="34" charset="0"/>
+              <a:buChar char="•"/>
+            </a:pPr>
+            <a:r>
+              <a:rPr lang="pt-PT" dirty="0"/>
+              <a:t>Android (72.37%)</a:t>
+            </a:r>
+          </a:p>
+          <a:p>
+            <a:pPr marL="342900" indent="-342900">
+              <a:buFont typeface="Arial" panose="020B0604020202020204" pitchFamily="34" charset="0"/>
+              <a:buChar char="•"/>
+            </a:pPr>
+            <a:r>
+              <a:rPr lang="pt-PT" dirty="0"/>
+              <a:t>iOS (26.98%)</a:t>
+            </a:r>
+          </a:p>
+          <a:p>
+            <a:r>
+              <a:rPr lang="en-GB" dirty="0"/>
+              <a:t>Single code base (Typescript and </a:t>
+            </a:r>
+            <a:r>
+              <a:rPr lang="en-GB" dirty="0" err="1"/>
+              <a:t>Javascript</a:t>
+            </a:r>
+            <a:r>
+              <a:rPr lang="en-GB" dirty="0"/>
+              <a:t> only!):</a:t>
+            </a:r>
+          </a:p>
+          <a:p>
+            <a:pPr marL="342900" indent="-342900">
+              <a:buFont typeface="Arial" panose="020B0604020202020204" pitchFamily="34" charset="0"/>
+              <a:buChar char="•"/>
+            </a:pPr>
+            <a:r>
+              <a:rPr lang="en-GB" dirty="0"/>
+              <a:t>React Native</a:t>
+            </a:r>
+          </a:p>
+          <a:p>
+            <a:pPr marL="342900" indent="-342900">
+              <a:buFont typeface="Arial" panose="020B0604020202020204" pitchFamily="34" charset="0"/>
+              <a:buChar char="•"/>
+            </a:pPr>
+            <a:r>
+              <a:rPr lang="en-GB" dirty="0"/>
+              <a:t>Expo</a:t>
+            </a:r>
+          </a:p>
+          <a:p>
+            <a:r>
+              <a:rPr lang="en-GB" dirty="0"/>
+              <a:t>Stateless message storage with periodic refresh for stable performance.</a:t>
+            </a:r>
+          </a:p>
+        </p:txBody>
+      </p:sp>
+    </p:spTree>
+    <p:extLst>
+      <p:ext uri="{BB962C8B-B14F-4D97-AF65-F5344CB8AC3E}">
+        <p14:creationId xmlns:p14="http://schemas.microsoft.com/office/powerpoint/2010/main" val="4126622935"/>
+      </p:ext>
+    </p:extLst>
+  </p:cSld>
+  <p:clrMapOvr>
+    <a:masterClrMapping/>
+  </p:clrMapOvr>
+</p:sld>
+</file>
+
+<file path=ppt/slides/slide6.xml><?xml version="1.0" encoding="utf-8"?>
 <p:sld xmlns:a="http://schemas.openxmlformats.org/drawingml/2006/main" xmlns:r="http://schemas.openxmlformats.org/officeDocument/2006/relationships" xmlns:p="http://schemas.openxmlformats.org/presentationml/2006/main">
   <p:cSld>
     <p:spTree>
@@ -3245,193 +5216,16 @@
           <a:bodyPr/>
           <a:lstStyle/>
           <a:p>
-            <a:r>
-              <a:rPr lang="en-GB" dirty="0"/>
-              <a:t>Work done / results</a:t>
-            </a:r>
-          </a:p>
-        </p:txBody>
-      </p:sp>
-      <p:sp>
-        <p:nvSpPr>
-          <p:cNvPr id="3" name="Content Placeholder 2">
-            <a:extLst>
-              <a:ext uri="{FF2B5EF4-FFF2-40B4-BE49-F238E27FC236}">
-                <a16:creationId xmlns:a16="http://schemas.microsoft.com/office/drawing/2014/main" id="{E8437074-DEEA-FE40-9330-58CFAD9D0E7F}"/>
-              </a:ext>
-            </a:extLst>
-          </p:cNvPr>
-          <p:cNvSpPr>
-            <a:spLocks noGrp="1"/>
-          </p:cNvSpPr>
-          <p:nvPr>
-            <p:ph idx="1"/>
-          </p:nvPr>
-        </p:nvSpPr>
-        <p:spPr>
-          <a:xfrm>
-            <a:off x="699418" y="1493058"/>
-            <a:ext cx="3914774" cy="5239531"/>
-          </a:xfrm>
-        </p:spPr>
-        <p:txBody>
-          <a:bodyPr/>
-          <a:lstStyle/>
-          <a:p>
-            <a:pPr marL="373380" indent="-342900">
-              <a:buFont typeface="Wingdings" panose="05000000000000000000" pitchFamily="2" charset="2"/>
-              <a:buChar char="§"/>
+            <a:pPr marL="30480" indent="0">
+              <a:buNone/>
             </a:pPr>
             <a:r>
               <a:rPr lang="en-GB" dirty="0">
                 <a:latin typeface="Helvetica Neue"/>
               </a:rPr>
-              <a:t>Message Persistent History </a:t>
-            </a:r>
-          </a:p>
-          <a:p>
-            <a:pPr marL="751205" lvl="1" indent="-342900"/>
-            <a:r>
-              <a:rPr lang="pt-PT" dirty="0" err="1">
-                <a:latin typeface="Helvetica Neue"/>
-              </a:rPr>
-              <a:t>Implemented</a:t>
-            </a:r>
-            <a:r>
-              <a:rPr lang="pt-PT" dirty="0">
-                <a:latin typeface="Helvetica Neue"/>
-              </a:rPr>
-              <a:t> for </a:t>
-            </a:r>
-            <a:r>
-              <a:rPr lang="pt-PT" dirty="0" err="1">
-                <a:latin typeface="Helvetica Neue"/>
-              </a:rPr>
-              <a:t>all</a:t>
-            </a:r>
-            <a:r>
-              <a:rPr lang="pt-PT" dirty="0">
-                <a:latin typeface="Helvetica Neue"/>
-              </a:rPr>
-              <a:t> </a:t>
-            </a:r>
-            <a:r>
-              <a:rPr lang="pt-PT" dirty="0" err="1">
-                <a:latin typeface="Helvetica Neue"/>
-              </a:rPr>
-              <a:t>required</a:t>
-            </a:r>
-            <a:r>
-              <a:rPr lang="pt-PT" dirty="0">
-                <a:latin typeface="Helvetica Neue"/>
-              </a:rPr>
-              <a:t> </a:t>
-            </a:r>
-            <a:r>
-              <a:rPr lang="pt-PT" dirty="0" err="1">
-                <a:latin typeface="Helvetica Neue"/>
-              </a:rPr>
-              <a:t>message</a:t>
-            </a:r>
-            <a:r>
-              <a:rPr lang="pt-PT" dirty="0">
-                <a:latin typeface="Helvetica Neue"/>
-              </a:rPr>
-              <a:t> </a:t>
-            </a:r>
-            <a:r>
-              <a:rPr lang="pt-PT" dirty="0" err="1">
-                <a:latin typeface="Helvetica Neue"/>
-              </a:rPr>
-              <a:t>types</a:t>
-            </a:r>
-            <a:endParaRPr lang="pt-PT" dirty="0">
-              <a:latin typeface="Helvetica Neue"/>
-            </a:endParaRPr>
-          </a:p>
-          <a:p>
-            <a:pPr marL="989330" lvl="2" indent="-342900"/>
-            <a:r>
-              <a:rPr lang="pt-PT" dirty="0" err="1">
-                <a:latin typeface="Helvetica Neue"/>
-              </a:rPr>
-              <a:t>DENMs</a:t>
-            </a:r>
-            <a:endParaRPr lang="pt-PT" dirty="0">
-              <a:latin typeface="Helvetica Neue"/>
-            </a:endParaRPr>
-          </a:p>
-          <a:p>
-            <a:pPr marL="989330" lvl="2" indent="-342900"/>
-            <a:r>
-              <a:rPr lang="pt-PT" dirty="0" err="1">
-                <a:latin typeface="Helvetica Neue"/>
-              </a:rPr>
-              <a:t>HDMAPs</a:t>
-            </a:r>
-            <a:endParaRPr lang="pt-PT" dirty="0">
-              <a:latin typeface="Helvetica Neue"/>
-            </a:endParaRPr>
-          </a:p>
-          <a:p>
-            <a:pPr marL="989330" lvl="2" indent="-342900"/>
-            <a:r>
-              <a:rPr lang="pt-PT" dirty="0" err="1">
-                <a:latin typeface="Helvetica Neue"/>
-              </a:rPr>
-              <a:t>IVIMs</a:t>
-            </a:r>
-            <a:endParaRPr lang="pt-PT" dirty="0">
-              <a:latin typeface="Helvetica Neue"/>
-            </a:endParaRPr>
-          </a:p>
-          <a:p>
-            <a:pPr marL="989330" lvl="2" indent="-342900"/>
-            <a:r>
-              <a:rPr lang="pt-PT" dirty="0" err="1">
-                <a:latin typeface="Helvetica Neue"/>
-              </a:rPr>
-              <a:t>SAEMs</a:t>
-            </a:r>
-            <a:endParaRPr lang="pt-PT" dirty="0">
-              <a:latin typeface="Helvetica Neue"/>
-            </a:endParaRPr>
-          </a:p>
-          <a:p>
-            <a:pPr marL="989330" lvl="2" indent="-342900"/>
-            <a:r>
-              <a:rPr lang="pt-PT" dirty="0" err="1">
-                <a:latin typeface="Helvetica Neue"/>
-              </a:rPr>
-              <a:t>TPMs</a:t>
-            </a:r>
-            <a:endParaRPr lang="pt-PT" dirty="0">
-              <a:latin typeface="Helvetica Neue"/>
-            </a:endParaRPr>
-          </a:p>
-          <a:p>
-            <a:pPr marL="373380" indent="-342900">
-              <a:buFont typeface="Wingdings" panose="05000000000000000000" pitchFamily="2" charset="2"/>
-              <a:buChar char="§"/>
-            </a:pPr>
-            <a:r>
-              <a:rPr lang="en-GB" dirty="0">
-                <a:latin typeface="Helvetica Neue"/>
-              </a:rPr>
-              <a:t>Minor bug fixes</a:t>
-            </a:r>
-          </a:p>
-          <a:p>
-            <a:pPr marL="373380" indent="-342900">
-              <a:buFont typeface="Wingdings" panose="05000000000000000000" pitchFamily="2" charset="2"/>
-              <a:buChar char="§"/>
-            </a:pPr>
-            <a:r>
-              <a:rPr lang="en-GB" dirty="0">
-                <a:latin typeface="Helvetica Neue"/>
-              </a:rPr>
-              <a:t>Literature on VRU</a:t>
-            </a:r>
+              <a:t>Cooperative, Connected and Automated Mobility Messages</a:t>
+            </a:r>
+            <a:endParaRPr lang="pt-PT" dirty="0"/>
           </a:p>
         </p:txBody>
       </p:sp>
@@ -3495,18 +5289,206 @@
               <a:pPr>
                 <a:defRPr/>
               </a:pPr>
-              <a:t>2</a:t>
+              <a:t>6</a:t>
             </a:fld>
             <a:endParaRPr lang="en-US" dirty="0"/>
+          </a:p>
+        </p:txBody>
+      </p:sp>
+      <p:sp>
+        <p:nvSpPr>
+          <p:cNvPr id="16" name="CaixaDeTexto 15">
+            <a:extLst>
+              <a:ext uri="{FF2B5EF4-FFF2-40B4-BE49-F238E27FC236}">
+                <a16:creationId xmlns:a16="http://schemas.microsoft.com/office/drawing/2014/main" id="{41F136D5-0E36-082C-ACBA-F4DB9F1B806C}"/>
+              </a:ext>
+            </a:extLst>
+          </p:cNvPr>
+          <p:cNvSpPr txBox="1"/>
+          <p:nvPr/>
+        </p:nvSpPr>
+        <p:spPr>
+          <a:xfrm>
+            <a:off x="682509" y="1287047"/>
+            <a:ext cx="5975466" cy="2677656"/>
+          </a:xfrm>
+          <a:prstGeom prst="rect">
+            <a:avLst/>
+          </a:prstGeom>
+          <a:noFill/>
+        </p:spPr>
+        <p:txBody>
+          <a:bodyPr rot="0" spcFirstLastPara="0" vertOverflow="overflow" horzOverflow="overflow" vert="horz" wrap="square" lIns="91440" tIns="45720" rIns="91440" bIns="45720" numCol="1" spcCol="0" rtlCol="0" fromWordArt="0" anchor="t" anchorCtr="0" forceAA="0" compatLnSpc="1">
+            <a:prstTxWarp prst="textNoShape">
+              <a:avLst/>
+            </a:prstTxWarp>
+            <a:spAutoFit/>
+          </a:bodyPr>
+          <a:lstStyle/>
+          <a:p>
+            <a:pPr marL="342900" indent="-342900">
+              <a:buFont typeface="Arial"/>
+              <a:buChar char="•"/>
+            </a:pPr>
+            <a:r>
+              <a:rPr lang="pt-PT" dirty="0">
+                <a:latin typeface="Helvetica Neue"/>
+                <a:ea typeface="ＭＳ Ｐゴシック"/>
+              </a:rPr>
+              <a:t>CPM</a:t>
+            </a:r>
+          </a:p>
+          <a:p>
+            <a:pPr marL="800100" lvl="1" indent="-342900">
+              <a:buFont typeface="Arial"/>
+              <a:buChar char="•"/>
+            </a:pPr>
+            <a:r>
+              <a:rPr lang="pt-PT" dirty="0" err="1">
+                <a:latin typeface="Helvetica Neue"/>
+                <a:ea typeface="ＭＳ Ｐゴシック"/>
+              </a:rPr>
+              <a:t>Cooperative</a:t>
+            </a:r>
+            <a:r>
+              <a:rPr lang="pt-PT" dirty="0">
+                <a:latin typeface="Helvetica Neue"/>
+                <a:ea typeface="ＭＳ Ｐゴシック"/>
+              </a:rPr>
+              <a:t> </a:t>
+            </a:r>
+            <a:r>
+              <a:rPr lang="pt-PT" dirty="0" err="1">
+                <a:latin typeface="Helvetica Neue"/>
+                <a:ea typeface="ＭＳ Ｐゴシック"/>
+              </a:rPr>
+              <a:t>Perception</a:t>
+            </a:r>
+            <a:r>
+              <a:rPr lang="pt-PT" dirty="0">
+                <a:latin typeface="Helvetica Neue"/>
+                <a:ea typeface="ＭＳ Ｐゴシック"/>
+              </a:rPr>
+              <a:t> </a:t>
+            </a:r>
+            <a:r>
+              <a:rPr lang="pt-PT" dirty="0" err="1">
+                <a:latin typeface="Helvetica Neue"/>
+                <a:ea typeface="ＭＳ Ｐゴシック"/>
+              </a:rPr>
+              <a:t>Message</a:t>
+            </a:r>
+            <a:endParaRPr lang="pt-PT" dirty="0">
+              <a:latin typeface="Helvetica Neue"/>
+              <a:ea typeface="ＭＳ Ｐゴシック"/>
+            </a:endParaRPr>
+          </a:p>
+          <a:p>
+            <a:pPr marL="342900" indent="-342900">
+              <a:buFont typeface="Arial"/>
+              <a:buChar char="•"/>
+            </a:pPr>
+            <a:r>
+              <a:rPr lang="pt-PT" dirty="0">
+                <a:latin typeface="Helvetica Neue"/>
+                <a:ea typeface="ＭＳ Ｐゴシック"/>
+              </a:rPr>
+              <a:t>CAM</a:t>
+            </a:r>
+          </a:p>
+          <a:p>
+            <a:pPr marL="800100" lvl="1" indent="-342900">
+              <a:buFont typeface="Arial"/>
+              <a:buChar char="•"/>
+            </a:pPr>
+            <a:r>
+              <a:rPr lang="pt-PT" dirty="0" err="1">
+                <a:latin typeface="Helvetica Neue"/>
+                <a:ea typeface="ＭＳ Ｐゴシック"/>
+              </a:rPr>
+              <a:t>Cooperative</a:t>
+            </a:r>
+            <a:r>
+              <a:rPr lang="pt-PT" dirty="0">
+                <a:latin typeface="Helvetica Neue"/>
+                <a:ea typeface="ＭＳ Ｐゴシック"/>
+              </a:rPr>
+              <a:t> </a:t>
+            </a:r>
+            <a:r>
+              <a:rPr lang="pt-PT" dirty="0" err="1">
+                <a:latin typeface="Helvetica Neue"/>
+                <a:ea typeface="ＭＳ Ｐゴシック"/>
+              </a:rPr>
+              <a:t>Awareness</a:t>
+            </a:r>
+            <a:r>
+              <a:rPr lang="pt-PT" dirty="0">
+                <a:latin typeface="Helvetica Neue"/>
+                <a:ea typeface="ＭＳ Ｐゴシック"/>
+              </a:rPr>
+              <a:t> </a:t>
+            </a:r>
+            <a:r>
+              <a:rPr lang="pt-PT" dirty="0" err="1">
+                <a:latin typeface="Helvetica Neue"/>
+                <a:ea typeface="ＭＳ Ｐゴシック"/>
+              </a:rPr>
+              <a:t>Message</a:t>
+            </a:r>
+            <a:endParaRPr lang="pt-PT" dirty="0">
+              <a:latin typeface="Helvetica Neue"/>
+              <a:ea typeface="ＭＳ Ｐゴシック"/>
+            </a:endParaRPr>
+          </a:p>
+          <a:p>
+            <a:pPr marL="342900" indent="-342900">
+              <a:buFont typeface="Arial"/>
+              <a:buChar char="•"/>
+            </a:pPr>
+            <a:r>
+              <a:rPr lang="pt-PT" dirty="0">
+                <a:latin typeface="Helvetica Neue"/>
+                <a:ea typeface="ＭＳ Ｐゴシック"/>
+              </a:rPr>
+              <a:t>IVIM</a:t>
+            </a:r>
+          </a:p>
+          <a:p>
+            <a:pPr marL="800100" lvl="1" indent="-342900">
+              <a:buFont typeface="Arial"/>
+              <a:buChar char="•"/>
+            </a:pPr>
+            <a:r>
+              <a:rPr lang="fr-FR" dirty="0">
+                <a:latin typeface="Helvetica Neue"/>
+                <a:ea typeface="ＭＳ Ｐゴシック"/>
+              </a:rPr>
+              <a:t>I2V Information Message</a:t>
+            </a:r>
+            <a:endParaRPr lang="pt-PT" dirty="0">
+              <a:latin typeface="Helvetica Neue"/>
+              <a:ea typeface="ＭＳ Ｐゴシック"/>
+            </a:endParaRPr>
+          </a:p>
+          <a:p>
+            <a:pPr marL="342900" indent="-342900">
+              <a:buFont typeface="Arial"/>
+              <a:buChar char="•"/>
+            </a:pPr>
+            <a:endParaRPr lang="pt-PT" dirty="0">
+              <a:latin typeface="Helvetica Neue"/>
+              <a:ea typeface="ＭＳ Ｐゴシック"/>
+            </a:endParaRPr>
           </a:p>
         </p:txBody>
       </p:sp>
       <p:grpSp>
         <p:nvGrpSpPr>
-          <p:cNvPr id="14" name="Group 13">
+          <p:cNvPr id="12" name="Group 11">
             <a:extLst>
               <a:ext uri="{FF2B5EF4-FFF2-40B4-BE49-F238E27FC236}">
-                <a16:creationId xmlns:a16="http://schemas.microsoft.com/office/drawing/2014/main" id="{51D52D6E-1392-19EA-2B70-8EE829FE3D10}"/>
+                <a16:creationId xmlns:a16="http://schemas.microsoft.com/office/drawing/2014/main" id="{75EAE7CD-E35E-E90F-8A52-F5D7762DEF7B}"/>
               </a:ext>
             </a:extLst>
           </p:cNvPr>
@@ -3515,77 +5497,256 @@
         </p:nvGrpSpPr>
         <p:grpSpPr>
           <a:xfrm>
-            <a:off x="5327652" y="1400969"/>
-            <a:ext cx="6164930" cy="3657600"/>
-            <a:chOff x="5327652" y="1400969"/>
-            <a:chExt cx="6164930" cy="3657600"/>
+            <a:off x="6769101" y="1298765"/>
+            <a:ext cx="4524375" cy="4894678"/>
+            <a:chOff x="7546268" y="1287047"/>
+            <a:chExt cx="4036132" cy="4507898"/>
           </a:xfrm>
         </p:grpSpPr>
-        <p:pic>
-          <p:nvPicPr>
-            <p:cNvPr id="7" name="Picture 6">
+        <p:grpSp>
+          <p:nvGrpSpPr>
+            <p:cNvPr id="10" name="Group 9">
               <a:extLst>
                 <a:ext uri="{FF2B5EF4-FFF2-40B4-BE49-F238E27FC236}">
-                  <a16:creationId xmlns:a16="http://schemas.microsoft.com/office/drawing/2014/main" id="{EF4D3892-5D90-2EEA-61FA-166E983DF21B}"/>
+                  <a16:creationId xmlns:a16="http://schemas.microsoft.com/office/drawing/2014/main" id="{44E28066-8205-BF9E-8F36-FC03FD52936C}"/>
                 </a:ext>
               </a:extLst>
             </p:cNvPr>
-            <p:cNvPicPr>
-              <a:picLocks noChangeAspect="1"/>
-            </p:cNvPicPr>
+            <p:cNvGrpSpPr/>
             <p:nvPr/>
-          </p:nvPicPr>
-          <p:blipFill>
-            <a:blip r:embed="rId2"/>
-            <a:stretch>
-              <a:fillRect/>
-            </a:stretch>
-          </p:blipFill>
-          <p:spPr>
+          </p:nvGrpSpPr>
+          <p:grpSpPr>
             <a:xfrm>
-              <a:off x="8492207" y="1410494"/>
-              <a:ext cx="3000375" cy="3648075"/>
+              <a:off x="9876297" y="1287047"/>
+              <a:ext cx="1706103" cy="4507898"/>
+              <a:chOff x="7105823" y="1446340"/>
+              <a:chExt cx="1706103" cy="4507898"/>
             </a:xfrm>
-            <a:prstGeom prst="rect">
-              <a:avLst/>
-            </a:prstGeom>
-          </p:spPr>
-        </p:pic>
-        <p:pic>
-          <p:nvPicPr>
-            <p:cNvPr id="9" name="Picture 8">
+          </p:grpSpPr>
+          <p:pic>
+            <p:nvPicPr>
+              <p:cNvPr id="13" name="Imagem 13">
+                <a:extLst>
+                  <a:ext uri="{FF2B5EF4-FFF2-40B4-BE49-F238E27FC236}">
+                    <a16:creationId xmlns:a16="http://schemas.microsoft.com/office/drawing/2014/main" id="{DEB93CB5-2D32-379B-7A0A-52FF35ED8B05}"/>
+                  </a:ext>
+                </a:extLst>
+              </p:cNvPr>
+              <p:cNvPicPr>
+                <a:picLocks noChangeAspect="1"/>
+              </p:cNvPicPr>
+              <p:nvPr/>
+            </p:nvPicPr>
+            <p:blipFill>
+              <a:blip r:embed="rId2" cstate="hqprint">
+                <a:extLst>
+                  <a:ext uri="{28A0092B-C50C-407E-A947-70E740481C1C}">
+                    <a14:useLocalDpi xmlns:a14="http://schemas.microsoft.com/office/drawing/2010/main"/>
+                  </a:ext>
+                </a:extLst>
+              </a:blip>
+              <a:stretch>
+                <a:fillRect/>
+              </a:stretch>
+            </p:blipFill>
+            <p:spPr>
+              <a:xfrm>
+                <a:off x="7105823" y="1446340"/>
+                <a:ext cx="1706103" cy="3877701"/>
+              </a:xfrm>
+              <a:prstGeom prst="rect">
+                <a:avLst/>
+              </a:prstGeom>
+            </p:spPr>
+          </p:pic>
+          <p:sp>
+            <p:nvSpPr>
+              <p:cNvPr id="14" name="CaixaDeTexto 13">
+                <a:extLst>
+                  <a:ext uri="{FF2B5EF4-FFF2-40B4-BE49-F238E27FC236}">
+                    <a16:creationId xmlns:a16="http://schemas.microsoft.com/office/drawing/2014/main" id="{3FE3550F-7817-C699-0071-AFD5C36E5145}"/>
+                  </a:ext>
+                </a:extLst>
+              </p:cNvPr>
+              <p:cNvSpPr txBox="1"/>
+              <p:nvPr/>
+            </p:nvSpPr>
+            <p:spPr>
+              <a:xfrm>
+                <a:off x="7543303" y="5486461"/>
+                <a:ext cx="831141" cy="467777"/>
+              </a:xfrm>
+              <a:prstGeom prst="rect">
+                <a:avLst/>
+              </a:prstGeom>
+              <a:noFill/>
+            </p:spPr>
+            <p:txBody>
+              <a:bodyPr rot="0" spcFirstLastPara="0" vertOverflow="overflow" horzOverflow="overflow" vert="horz" wrap="square" lIns="91440" tIns="45720" rIns="91440" bIns="45720" numCol="1" spcCol="0" rtlCol="0" fromWordArt="0" anchor="ctr" anchorCtr="0" forceAA="0" compatLnSpc="1">
+                <a:prstTxWarp prst="textNoShape">
+                  <a:avLst/>
+                </a:prstTxWarp>
+                <a:spAutoFit/>
+              </a:bodyPr>
+              <a:lstStyle/>
+              <a:p>
+                <a:pPr algn="ctr"/>
+                <a:r>
+                  <a:rPr lang="pt-PT" sz="1600" dirty="0">
+                    <a:latin typeface="Arial"/>
+                    <a:ea typeface="ＭＳ Ｐゴシック"/>
+                  </a:rPr>
+                  <a:t>IVIM</a:t>
+                </a:r>
+                <a:endParaRPr lang="pt-PT" sz="1600" dirty="0"/>
+              </a:p>
+            </p:txBody>
+          </p:sp>
+        </p:grpSp>
+        <p:grpSp>
+          <p:nvGrpSpPr>
+            <p:cNvPr id="11" name="Group 10">
               <a:extLst>
                 <a:ext uri="{FF2B5EF4-FFF2-40B4-BE49-F238E27FC236}">
-                  <a16:creationId xmlns:a16="http://schemas.microsoft.com/office/drawing/2014/main" id="{547AE411-6A93-CE76-F721-B717302E73DF}"/>
+                  <a16:creationId xmlns:a16="http://schemas.microsoft.com/office/drawing/2014/main" id="{7E6A73E5-B90B-7467-1665-6B030B1BC2EE}"/>
                 </a:ext>
               </a:extLst>
             </p:cNvPr>
-            <p:cNvPicPr>
-              <a:picLocks noChangeAspect="1"/>
-            </p:cNvPicPr>
+            <p:cNvGrpSpPr/>
             <p:nvPr/>
-          </p:nvPicPr>
-          <p:blipFill>
-            <a:blip r:embed="rId3"/>
-            <a:stretch>
-              <a:fillRect/>
-            </a:stretch>
-          </p:blipFill>
-          <p:spPr>
+          </p:nvGrpSpPr>
+          <p:grpSpPr>
             <a:xfrm>
-              <a:off x="5327652" y="1400969"/>
-              <a:ext cx="2971800" cy="3657600"/>
+              <a:off x="7546268" y="1287241"/>
+              <a:ext cx="2090447" cy="4507704"/>
+              <a:chOff x="4105274" y="1415217"/>
+              <a:chExt cx="2090447" cy="4507704"/>
             </a:xfrm>
-            <a:prstGeom prst="rect">
-              <a:avLst/>
-            </a:prstGeom>
-          </p:spPr>
-        </p:pic>
+          </p:grpSpPr>
+          <p:sp>
+            <p:nvSpPr>
+              <p:cNvPr id="9" name="CaixaDeTexto 8">
+                <a:extLst>
+                  <a:ext uri="{FF2B5EF4-FFF2-40B4-BE49-F238E27FC236}">
+                    <a16:creationId xmlns:a16="http://schemas.microsoft.com/office/drawing/2014/main" id="{C4EC1588-561A-B386-72E7-D4E60D58C25E}"/>
+                  </a:ext>
+                </a:extLst>
+              </p:cNvPr>
+              <p:cNvSpPr txBox="1"/>
+              <p:nvPr/>
+            </p:nvSpPr>
+            <p:spPr>
+              <a:xfrm>
+                <a:off x="4105274" y="5508192"/>
+                <a:ext cx="2090447" cy="414729"/>
+              </a:xfrm>
+              <a:prstGeom prst="rect">
+                <a:avLst/>
+              </a:prstGeom>
+              <a:noFill/>
+            </p:spPr>
+            <p:txBody>
+              <a:bodyPr rot="0" spcFirstLastPara="0" vertOverflow="overflow" horzOverflow="overflow" vert="horz" wrap="square" lIns="91440" tIns="45720" rIns="91440" bIns="45720" numCol="1" spcCol="0" rtlCol="0" fromWordArt="0" anchor="ctr" anchorCtr="0" forceAA="0" compatLnSpc="1">
+                <a:prstTxWarp prst="textNoShape">
+                  <a:avLst/>
+                </a:prstTxWarp>
+                <a:spAutoFit/>
+              </a:bodyPr>
+              <a:lstStyle/>
+              <a:p>
+                <a:pPr algn="ctr"/>
+                <a:r>
+                  <a:rPr lang="pt-PT" sz="1600" dirty="0" err="1">
+                    <a:latin typeface="Arial"/>
+                    <a:ea typeface="ＭＳ Ｐゴシック"/>
+                  </a:rPr>
+                  <a:t>CPMs</a:t>
+                </a:r>
+                <a:r>
+                  <a:rPr lang="pt-PT" sz="1600" dirty="0">
+                    <a:latin typeface="Arial"/>
+                    <a:ea typeface="ＭＳ Ｐゴシック"/>
+                  </a:rPr>
+                  <a:t> </a:t>
+                </a:r>
+                <a:r>
+                  <a:rPr lang="pt-PT" sz="1600" dirty="0" err="1">
+                    <a:latin typeface="Arial"/>
+                    <a:ea typeface="ＭＳ Ｐゴシック"/>
+                  </a:rPr>
+                  <a:t>and</a:t>
+                </a:r>
+                <a:r>
+                  <a:rPr lang="pt-PT" sz="1600" dirty="0">
+                    <a:latin typeface="Arial"/>
+                    <a:ea typeface="ＭＳ Ｐゴシック"/>
+                  </a:rPr>
+                  <a:t> </a:t>
+                </a:r>
+                <a:r>
+                  <a:rPr lang="pt-PT" sz="1600" dirty="0" err="1">
+                    <a:latin typeface="Arial"/>
+                    <a:ea typeface="ＭＳ Ｐゴシック"/>
+                  </a:rPr>
+                  <a:t>CAMs</a:t>
+                </a:r>
+                <a:endParaRPr lang="pt-PT" sz="1600" dirty="0"/>
+              </a:p>
+            </p:txBody>
+          </p:sp>
+          <p:pic>
+            <p:nvPicPr>
+              <p:cNvPr id="1026" name="Picture 2">
+                <a:extLst>
+                  <a:ext uri="{FF2B5EF4-FFF2-40B4-BE49-F238E27FC236}">
+                    <a16:creationId xmlns:a16="http://schemas.microsoft.com/office/drawing/2014/main" id="{A1B248DE-96CD-017B-FD2E-203B7DFD5D67}"/>
+                  </a:ext>
+                </a:extLst>
+              </p:cNvPr>
+              <p:cNvPicPr>
+                <a:picLocks noChangeAspect="1" noChangeArrowheads="1"/>
+              </p:cNvPicPr>
+              <p:nvPr/>
+            </p:nvPicPr>
+            <p:blipFill>
+              <a:blip r:embed="rId3" cstate="email">
+                <a:extLst>
+                  <a:ext uri="{28A0092B-C50C-407E-A947-70E740481C1C}">
+                    <a14:useLocalDpi xmlns:a14="http://schemas.microsoft.com/office/drawing/2010/main" val="0"/>
+                  </a:ext>
+                </a:extLst>
+              </a:blip>
+              <a:srcRect/>
+              <a:stretch>
+                <a:fillRect/>
+              </a:stretch>
+            </p:blipFill>
+            <p:spPr bwMode="auto">
+              <a:xfrm>
+                <a:off x="4306545" y="1415217"/>
+                <a:ext cx="1687906" cy="3908824"/>
+              </a:xfrm>
+              <a:prstGeom prst="rect">
+                <a:avLst/>
+              </a:prstGeom>
+              <a:noFill/>
+              <a:extLst>
+                <a:ext uri="{909E8E84-426E-40DD-AFC4-6F175D3DCCD1}">
+                  <a14:hiddenFill xmlns:a14="http://schemas.microsoft.com/office/drawing/2010/main">
+                    <a:solidFill>
+                      <a:srgbClr val="FFFFFF"/>
+                    </a:solidFill>
+                  </a14:hiddenFill>
+                </a:ext>
+              </a:extLst>
+            </p:spPr>
+          </p:pic>
+        </p:grpSp>
       </p:grpSp>
     </p:spTree>
     <p:extLst>
       <p:ext uri="{BB962C8B-B14F-4D97-AF65-F5344CB8AC3E}">
-        <p14:creationId xmlns:p14="http://schemas.microsoft.com/office/powerpoint/2010/main" val="2941313487"/>
+        <p14:creationId xmlns:p14="http://schemas.microsoft.com/office/powerpoint/2010/main" val="273897912"/>
       </p:ext>
     </p:extLst>
   </p:cSld>
@@ -3595,7 +5756,7 @@
 </p:sld>
 </file>
 
-<file path=ppt/slides/slide3.xml><?xml version="1.0" encoding="utf-8"?>
+<file path=ppt/slides/slide7.xml><?xml version="1.0" encoding="utf-8"?>
 <p:sld xmlns:a="http://schemas.openxmlformats.org/drawingml/2006/main" xmlns:r="http://schemas.openxmlformats.org/officeDocument/2006/relationships" xmlns:p="http://schemas.openxmlformats.org/presentationml/2006/main">
   <p:cSld>
     <p:spTree>
@@ -3633,10 +5794,16 @@
           <a:bodyPr/>
           <a:lstStyle/>
           <a:p>
-            <a:r>
-              <a:rPr lang="en-GB" dirty="0"/>
-              <a:t>Pre-Dissertation Structure Proposal</a:t>
-            </a:r>
+            <a:pPr marL="30480" indent="0">
+              <a:buNone/>
+            </a:pPr>
+            <a:r>
+              <a:rPr lang="en-GB" dirty="0">
+                <a:latin typeface="Helvetica Neue"/>
+              </a:rPr>
+              <a:t>CCAM Messages</a:t>
+            </a:r>
+            <a:endParaRPr lang="pt-PT" dirty="0"/>
           </a:p>
         </p:txBody>
       </p:sp>
@@ -3645,7 +5812,7 @@
           <p:cNvPr id="5" name="Footer Placeholder 4">
             <a:extLst>
               <a:ext uri="{FF2B5EF4-FFF2-40B4-BE49-F238E27FC236}">
-                <a16:creationId xmlns:a16="http://schemas.microsoft.com/office/drawing/2014/main" id="{72F98D5C-9ECC-C346-AEB0-258E7C97B3A9}"/>
+                <a16:creationId xmlns:a16="http://schemas.microsoft.com/office/drawing/2014/main" id="{4A5F06B7-5AE3-8B4A-901A-53BD09B6E7FF}"/>
               </a:ext>
             </a:extLst>
           </p:cNvPr>
@@ -3665,7 +5832,7 @@
               <a:defRPr/>
             </a:pPr>
             <a:r>
-              <a:rPr lang="en-US"/>
+              <a:rPr lang="en-US" dirty="0"/>
               <a:t>DETI / MEI / PDE / 2022-23</a:t>
             </a:r>
           </a:p>
@@ -3676,7 +5843,7 @@
           <p:cNvPr id="6" name="Slide Number Placeholder 5">
             <a:extLst>
               <a:ext uri="{FF2B5EF4-FFF2-40B4-BE49-F238E27FC236}">
-                <a16:creationId xmlns:a16="http://schemas.microsoft.com/office/drawing/2014/main" id="{51D80DF4-B4D0-6548-974A-9C71BB2E2B40}"/>
+                <a16:creationId xmlns:a16="http://schemas.microsoft.com/office/drawing/2014/main" id="{BA1D1089-536D-1A4F-AA9C-A324816262D3}"/>
               </a:ext>
             </a:extLst>
           </p:cNvPr>
@@ -3700,47 +5867,1023 @@
               <a:pPr>
                 <a:defRPr/>
               </a:pPr>
-              <a:t>3</a:t>
+              <a:t>7</a:t>
             </a:fld>
             <a:endParaRPr lang="en-US" dirty="0"/>
           </a:p>
         </p:txBody>
       </p:sp>
-      <p:pic>
-        <p:nvPicPr>
-          <p:cNvPr id="13" name="Content Placeholder 12">
+      <p:sp>
+        <p:nvSpPr>
+          <p:cNvPr id="16" name="CaixaDeTexto 15">
             <a:extLst>
               <a:ext uri="{FF2B5EF4-FFF2-40B4-BE49-F238E27FC236}">
-                <a16:creationId xmlns:a16="http://schemas.microsoft.com/office/drawing/2014/main" id="{6D2C376B-7A9C-E52A-CC56-B2608EC2ED09}"/>
+                <a16:creationId xmlns:a16="http://schemas.microsoft.com/office/drawing/2014/main" id="{41F136D5-0E36-082C-ACBA-F4DB9F1B806C}"/>
               </a:ext>
             </a:extLst>
           </p:cNvPr>
-          <p:cNvPicPr>
-            <a:picLocks noGrp="1" noChangeAspect="1"/>
-          </p:cNvPicPr>
-          <p:nvPr>
-            <p:ph idx="1"/>
-          </p:nvPr>
-        </p:nvPicPr>
-        <p:blipFill>
-          <a:blip r:embed="rId2"/>
-          <a:stretch>
-            <a:fillRect/>
-          </a:stretch>
-        </p:blipFill>
+          <p:cNvSpPr txBox="1"/>
+          <p:nvPr/>
+        </p:nvSpPr>
         <p:spPr>
           <a:xfrm>
-            <a:off x="1882113" y="1383428"/>
-            <a:ext cx="5151176" cy="4342562"/>
+            <a:off x="682509" y="1287047"/>
+            <a:ext cx="5499216" cy="1938992"/>
           </a:xfrm>
+          <a:prstGeom prst="rect">
+            <a:avLst/>
+          </a:prstGeom>
+          <a:noFill/>
         </p:spPr>
-      </p:pic>
+        <p:txBody>
+          <a:bodyPr rot="0" spcFirstLastPara="0" vertOverflow="overflow" horzOverflow="overflow" vert="horz" wrap="square" lIns="91440" tIns="45720" rIns="91440" bIns="45720" numCol="1" spcCol="0" rtlCol="0" fromWordArt="0" anchor="t" anchorCtr="0" forceAA="0" compatLnSpc="1">
+            <a:prstTxWarp prst="textNoShape">
+              <a:avLst/>
+            </a:prstTxWarp>
+            <a:spAutoFit/>
+          </a:bodyPr>
+          <a:lstStyle/>
+          <a:p>
+            <a:pPr marL="342900" indent="-342900">
+              <a:buFont typeface="Arial"/>
+              <a:buChar char="•"/>
+            </a:pPr>
+            <a:r>
+              <a:rPr lang="pt-PT" dirty="0">
+                <a:latin typeface="Helvetica Neue"/>
+                <a:ea typeface="ＭＳ Ｐゴシック"/>
+              </a:rPr>
+              <a:t>VAM</a:t>
+            </a:r>
+          </a:p>
+          <a:p>
+            <a:pPr marL="800100" lvl="1" indent="-342900">
+              <a:buFont typeface="Arial"/>
+              <a:buChar char="•"/>
+            </a:pPr>
+            <a:r>
+              <a:rPr lang="pt-PT" dirty="0">
+                <a:latin typeface="Helvetica Neue"/>
+                <a:ea typeface="ＭＳ Ｐゴシック"/>
+              </a:rPr>
+              <a:t>VRU </a:t>
+            </a:r>
+            <a:r>
+              <a:rPr lang="pt-PT" dirty="0" err="1">
+                <a:latin typeface="Helvetica Neue"/>
+                <a:ea typeface="ＭＳ Ｐゴシック"/>
+              </a:rPr>
+              <a:t>Awareness</a:t>
+            </a:r>
+            <a:r>
+              <a:rPr lang="pt-PT" dirty="0">
+                <a:latin typeface="Helvetica Neue"/>
+                <a:ea typeface="ＭＳ Ｐゴシック"/>
+              </a:rPr>
+              <a:t> </a:t>
+            </a:r>
+            <a:r>
+              <a:rPr lang="pt-PT" dirty="0" err="1">
+                <a:latin typeface="Helvetica Neue"/>
+                <a:ea typeface="ＭＳ Ｐゴシック"/>
+              </a:rPr>
+              <a:t>Message</a:t>
+            </a:r>
+            <a:endParaRPr lang="pt-PT" dirty="0">
+              <a:latin typeface="Helvetica Neue"/>
+              <a:ea typeface="ＭＳ Ｐゴシック"/>
+            </a:endParaRPr>
+          </a:p>
+          <a:p>
+            <a:pPr marL="342900" indent="-342900">
+              <a:buFont typeface="Arial"/>
+              <a:buChar char="•"/>
+            </a:pPr>
+            <a:r>
+              <a:rPr lang="pt-PT" dirty="0">
+                <a:latin typeface="Helvetica Neue"/>
+                <a:ea typeface="ＭＳ Ｐゴシック"/>
+              </a:rPr>
+              <a:t>DENM</a:t>
+            </a:r>
+          </a:p>
+          <a:p>
+            <a:pPr marL="800100" lvl="1" indent="-342900">
+              <a:buFont typeface="Arial"/>
+              <a:buChar char="•"/>
+            </a:pPr>
+            <a:r>
+              <a:rPr lang="pt-PT" dirty="0" err="1">
+                <a:latin typeface="Helvetica Neue"/>
+                <a:ea typeface="ＭＳ Ｐゴシック"/>
+              </a:rPr>
+              <a:t>Decentralized</a:t>
+            </a:r>
+            <a:r>
+              <a:rPr lang="pt-PT" dirty="0">
+                <a:latin typeface="Helvetica Neue"/>
+                <a:ea typeface="ＭＳ Ｐゴシック"/>
+              </a:rPr>
+              <a:t> </a:t>
+            </a:r>
+            <a:r>
+              <a:rPr lang="pt-PT" dirty="0" err="1">
+                <a:latin typeface="Helvetica Neue"/>
+                <a:ea typeface="ＭＳ Ｐゴシック"/>
+              </a:rPr>
+              <a:t>Environmental</a:t>
+            </a:r>
+            <a:r>
+              <a:rPr lang="pt-PT" dirty="0">
+                <a:latin typeface="Helvetica Neue"/>
+                <a:ea typeface="ＭＳ Ｐゴシック"/>
+              </a:rPr>
+              <a:t> </a:t>
+            </a:r>
+            <a:r>
+              <a:rPr lang="pt-PT" dirty="0" err="1">
+                <a:latin typeface="Helvetica Neue"/>
+                <a:ea typeface="ＭＳ Ｐゴシック"/>
+              </a:rPr>
+              <a:t>Notification</a:t>
+            </a:r>
+            <a:r>
+              <a:rPr lang="pt-PT" dirty="0">
+                <a:latin typeface="Helvetica Neue"/>
+                <a:ea typeface="ＭＳ Ｐゴシック"/>
+              </a:rPr>
+              <a:t> </a:t>
+            </a:r>
+            <a:r>
+              <a:rPr lang="pt-PT" dirty="0" err="1">
+                <a:latin typeface="Helvetica Neue"/>
+                <a:ea typeface="ＭＳ Ｐゴシック"/>
+              </a:rPr>
+              <a:t>Message</a:t>
+            </a:r>
+            <a:r>
+              <a:rPr lang="pt-PT" dirty="0">
+                <a:latin typeface="Helvetica Neue"/>
+                <a:ea typeface="ＭＳ Ｐゴシック"/>
+              </a:rPr>
+              <a:t> </a:t>
+            </a:r>
+          </a:p>
+        </p:txBody>
+      </p:sp>
+      <p:grpSp>
+        <p:nvGrpSpPr>
+          <p:cNvPr id="18" name="Group 17">
+            <a:extLst>
+              <a:ext uri="{FF2B5EF4-FFF2-40B4-BE49-F238E27FC236}">
+                <a16:creationId xmlns:a16="http://schemas.microsoft.com/office/drawing/2014/main" id="{F367ADBF-2841-CB1D-E6B3-77C4816C1B5F}"/>
+              </a:ext>
+            </a:extLst>
+          </p:cNvPr>
+          <p:cNvGrpSpPr/>
+          <p:nvPr/>
+        </p:nvGrpSpPr>
+        <p:grpSpPr>
+          <a:xfrm>
+            <a:off x="6819900" y="1287046"/>
+            <a:ext cx="4569731" cy="4751803"/>
+            <a:chOff x="7483476" y="1332673"/>
+            <a:chExt cx="4391930" cy="4547296"/>
+          </a:xfrm>
+        </p:grpSpPr>
+        <p:grpSp>
+          <p:nvGrpSpPr>
+            <p:cNvPr id="8" name="Group 7">
+              <a:extLst>
+                <a:ext uri="{FF2B5EF4-FFF2-40B4-BE49-F238E27FC236}">
+                  <a16:creationId xmlns:a16="http://schemas.microsoft.com/office/drawing/2014/main" id="{1ABE37EA-DB80-3F90-F822-AA70E1885617}"/>
+                </a:ext>
+              </a:extLst>
+            </p:cNvPr>
+            <p:cNvGrpSpPr/>
+            <p:nvPr/>
+          </p:nvGrpSpPr>
+          <p:grpSpPr>
+            <a:xfrm>
+              <a:off x="7483476" y="1332673"/>
+              <a:ext cx="2090447" cy="4469811"/>
+              <a:chOff x="7843884" y="1287046"/>
+              <a:chExt cx="2090447" cy="4469811"/>
+            </a:xfrm>
+          </p:grpSpPr>
+          <p:pic>
+            <p:nvPicPr>
+              <p:cNvPr id="4" name="Picture 3" descr="Map&#10;&#10;Description automatically generated">
+                <a:extLst>
+                  <a:ext uri="{FF2B5EF4-FFF2-40B4-BE49-F238E27FC236}">
+                    <a16:creationId xmlns:a16="http://schemas.microsoft.com/office/drawing/2014/main" id="{24C9EF41-B15F-C214-8AB2-EAE93EFD0EC7}"/>
+                  </a:ext>
+                </a:extLst>
+              </p:cNvPr>
+              <p:cNvPicPr>
+                <a:picLocks noChangeAspect="1"/>
+              </p:cNvPicPr>
+              <p:nvPr/>
+            </p:nvPicPr>
+            <p:blipFill>
+              <a:blip r:embed="rId2" cstate="email">
+                <a:extLst>
+                  <a:ext uri="{28A0092B-C50C-407E-A947-70E740481C1C}">
+                    <a14:useLocalDpi xmlns:a14="http://schemas.microsoft.com/office/drawing/2010/main" val="0"/>
+                  </a:ext>
+                </a:extLst>
+              </a:blip>
+              <a:stretch>
+                <a:fillRect/>
+              </a:stretch>
+            </p:blipFill>
+            <p:spPr>
+              <a:xfrm>
+                <a:off x="7993256" y="1287046"/>
+                <a:ext cx="1791705" cy="3877701"/>
+              </a:xfrm>
+              <a:prstGeom prst="rect">
+                <a:avLst/>
+              </a:prstGeom>
+            </p:spPr>
+          </p:pic>
+          <p:sp>
+            <p:nvSpPr>
+              <p:cNvPr id="7" name="CaixaDeTexto 8">
+                <a:extLst>
+                  <a:ext uri="{FF2B5EF4-FFF2-40B4-BE49-F238E27FC236}">
+                    <a16:creationId xmlns:a16="http://schemas.microsoft.com/office/drawing/2014/main" id="{678D6E11-3A10-53DF-0A44-B0B081F65EED}"/>
+                  </a:ext>
+                </a:extLst>
+              </p:cNvPr>
+              <p:cNvSpPr txBox="1"/>
+              <p:nvPr/>
+            </p:nvSpPr>
+            <p:spPr>
+              <a:xfrm>
+                <a:off x="7843884" y="5418303"/>
+                <a:ext cx="2090447" cy="338554"/>
+              </a:xfrm>
+              <a:prstGeom prst="rect">
+                <a:avLst/>
+              </a:prstGeom>
+              <a:noFill/>
+            </p:spPr>
+            <p:txBody>
+              <a:bodyPr rot="0" spcFirstLastPara="0" vertOverflow="overflow" horzOverflow="overflow" vert="horz" wrap="square" lIns="91440" tIns="45720" rIns="91440" bIns="45720" numCol="1" spcCol="0" rtlCol="0" fromWordArt="0" anchor="ctr" anchorCtr="0" forceAA="0" compatLnSpc="1">
+                <a:prstTxWarp prst="textNoShape">
+                  <a:avLst/>
+                </a:prstTxWarp>
+                <a:spAutoFit/>
+              </a:bodyPr>
+              <a:lstStyle/>
+              <a:p>
+                <a:pPr algn="ctr"/>
+                <a:r>
+                  <a:rPr lang="pt-PT" sz="1600" dirty="0" err="1">
+                    <a:latin typeface="Arial"/>
+                    <a:ea typeface="ＭＳ Ｐゴシック"/>
+                  </a:rPr>
+                  <a:t>VAMs</a:t>
+                </a:r>
+                <a:endParaRPr lang="pt-PT" sz="1600" dirty="0"/>
+              </a:p>
+            </p:txBody>
+          </p:sp>
+        </p:grpSp>
+        <p:grpSp>
+          <p:nvGrpSpPr>
+            <p:cNvPr id="17" name="Group 16">
+              <a:extLst>
+                <a:ext uri="{FF2B5EF4-FFF2-40B4-BE49-F238E27FC236}">
+                  <a16:creationId xmlns:a16="http://schemas.microsoft.com/office/drawing/2014/main" id="{ECD37A5E-C971-8E3E-E61F-0805278D4C27}"/>
+                </a:ext>
+              </a:extLst>
+            </p:cNvPr>
+            <p:cNvGrpSpPr/>
+            <p:nvPr/>
+          </p:nvGrpSpPr>
+          <p:grpSpPr>
+            <a:xfrm>
+              <a:off x="9784959" y="1332673"/>
+              <a:ext cx="2090447" cy="4547296"/>
+              <a:chOff x="9784959" y="1332673"/>
+              <a:chExt cx="2090447" cy="4547296"/>
+            </a:xfrm>
+          </p:grpSpPr>
+          <p:pic>
+            <p:nvPicPr>
+              <p:cNvPr id="12" name="Picture 11" descr="A picture containing text, tree, outdoor&#10;&#10;Description automatically generated">
+                <a:extLst>
+                  <a:ext uri="{FF2B5EF4-FFF2-40B4-BE49-F238E27FC236}">
+                    <a16:creationId xmlns:a16="http://schemas.microsoft.com/office/drawing/2014/main" id="{8FBBCF4B-5F92-7AF0-35D6-F5B4B396123F}"/>
+                  </a:ext>
+                </a:extLst>
+              </p:cNvPr>
+              <p:cNvPicPr>
+                <a:picLocks noChangeAspect="1"/>
+              </p:cNvPicPr>
+              <p:nvPr/>
+            </p:nvPicPr>
+            <p:blipFill>
+              <a:blip r:embed="rId3" cstate="email">
+                <a:extLst>
+                  <a:ext uri="{28A0092B-C50C-407E-A947-70E740481C1C}">
+                    <a14:useLocalDpi xmlns:a14="http://schemas.microsoft.com/office/drawing/2010/main" val="0"/>
+                  </a:ext>
+                </a:extLst>
+              </a:blip>
+              <a:stretch>
+                <a:fillRect/>
+              </a:stretch>
+            </p:blipFill>
+            <p:spPr>
+              <a:xfrm>
+                <a:off x="9934331" y="1332673"/>
+                <a:ext cx="1791705" cy="3877700"/>
+              </a:xfrm>
+              <a:prstGeom prst="rect">
+                <a:avLst/>
+              </a:prstGeom>
+            </p:spPr>
+          </p:pic>
+          <p:sp>
+            <p:nvSpPr>
+              <p:cNvPr id="15" name="CaixaDeTexto 8">
+                <a:extLst>
+                  <a:ext uri="{FF2B5EF4-FFF2-40B4-BE49-F238E27FC236}">
+                    <a16:creationId xmlns:a16="http://schemas.microsoft.com/office/drawing/2014/main" id="{AD5B0B82-2E4A-71AA-9EB1-4721CABF6A8D}"/>
+                  </a:ext>
+                </a:extLst>
+              </p:cNvPr>
+              <p:cNvSpPr txBox="1"/>
+              <p:nvPr/>
+            </p:nvSpPr>
+            <p:spPr>
+              <a:xfrm>
+                <a:off x="9784959" y="5295194"/>
+                <a:ext cx="2090447" cy="584775"/>
+              </a:xfrm>
+              <a:prstGeom prst="rect">
+                <a:avLst/>
+              </a:prstGeom>
+              <a:noFill/>
+            </p:spPr>
+            <p:txBody>
+              <a:bodyPr rot="0" spcFirstLastPara="0" vertOverflow="overflow" horzOverflow="overflow" vert="horz" wrap="square" lIns="91440" tIns="45720" rIns="91440" bIns="45720" numCol="1" spcCol="0" rtlCol="0" fromWordArt="0" anchor="ctr" anchorCtr="0" forceAA="0" compatLnSpc="1">
+                <a:prstTxWarp prst="textNoShape">
+                  <a:avLst/>
+                </a:prstTxWarp>
+                <a:spAutoFit/>
+              </a:bodyPr>
+              <a:lstStyle/>
+              <a:p>
+                <a:pPr algn="ctr"/>
+                <a:r>
+                  <a:rPr lang="pt-PT" sz="1600" dirty="0" err="1">
+                    <a:latin typeface="Arial"/>
+                    <a:ea typeface="ＭＳ Ｐゴシック"/>
+                  </a:rPr>
+                  <a:t>DENMs</a:t>
+                </a:r>
+                <a:endParaRPr lang="pt-PT" sz="1600" dirty="0">
+                  <a:latin typeface="Arial"/>
+                  <a:ea typeface="ＭＳ Ｐゴシック"/>
+                </a:endParaRPr>
+              </a:p>
+              <a:p>
+                <a:pPr algn="ctr"/>
+                <a:r>
+                  <a:rPr lang="pt-PT" sz="1600" dirty="0">
+                    <a:latin typeface="Arial"/>
+                    <a:ea typeface="ＭＳ Ｐゴシック"/>
+                  </a:rPr>
+                  <a:t>Menu</a:t>
+                </a:r>
+                <a:endParaRPr lang="pt-PT" sz="1600" dirty="0"/>
+              </a:p>
+            </p:txBody>
+          </p:sp>
+        </p:grpSp>
+      </p:grpSp>
+    </p:spTree>
+    <p:extLst>
+      <p:ext uri="{BB962C8B-B14F-4D97-AF65-F5344CB8AC3E}">
+        <p14:creationId xmlns:p14="http://schemas.microsoft.com/office/powerpoint/2010/main" val="3002019913"/>
+      </p:ext>
+    </p:extLst>
+  </p:cSld>
+  <p:clrMapOvr>
+    <a:masterClrMapping/>
+  </p:clrMapOvr>
+</p:sld>
+</file>
+
+<file path=ppt/slides/slide8.xml><?xml version="1.0" encoding="utf-8"?>
+<p:sld xmlns:a="http://schemas.openxmlformats.org/drawingml/2006/main" xmlns:r="http://schemas.openxmlformats.org/officeDocument/2006/relationships" xmlns:p="http://schemas.openxmlformats.org/presentationml/2006/main">
+  <p:cSld>
+    <p:spTree>
+      <p:nvGrpSpPr>
+        <p:cNvPr id="1" name=""/>
+        <p:cNvGrpSpPr/>
+        <p:nvPr/>
+      </p:nvGrpSpPr>
+      <p:grpSpPr>
+        <a:xfrm>
+          <a:off x="0" y="0"/>
+          <a:ext cx="0" cy="0"/>
+          <a:chOff x="0" y="0"/>
+          <a:chExt cx="0" cy="0"/>
+        </a:xfrm>
+      </p:grpSpPr>
+      <p:sp>
+        <p:nvSpPr>
+          <p:cNvPr id="2" name="Title 1">
+            <a:extLst>
+              <a:ext uri="{FF2B5EF4-FFF2-40B4-BE49-F238E27FC236}">
+                <a16:creationId xmlns:a16="http://schemas.microsoft.com/office/drawing/2014/main" id="{5C1FD17E-CA27-3943-80DF-1AAF2EBDED63}"/>
+              </a:ext>
+            </a:extLst>
+          </p:cNvPr>
+          <p:cNvSpPr>
+            <a:spLocks noGrp="1"/>
+          </p:cNvSpPr>
+          <p:nvPr>
+            <p:ph type="title"/>
+          </p:nvPr>
+        </p:nvSpPr>
+        <p:spPr/>
+        <p:txBody>
+          <a:bodyPr/>
+          <a:lstStyle/>
+          <a:p>
+            <a:r>
+              <a:rPr lang="pt-PT" dirty="0">
+                <a:latin typeface="Helvetica Neue"/>
+                <a:ea typeface="ＭＳ Ｐゴシック"/>
+              </a:rPr>
+              <a:t>A-To-</a:t>
+            </a:r>
+            <a:r>
+              <a:rPr lang="pt-PT" dirty="0" err="1">
+                <a:latin typeface="Helvetica Neue"/>
+                <a:ea typeface="ＭＳ Ｐゴシック"/>
+              </a:rPr>
+              <a:t>Be</a:t>
+            </a:r>
+            <a:r>
+              <a:rPr lang="pt-PT" dirty="0">
+                <a:latin typeface="Helvetica Neue"/>
+                <a:ea typeface="ＭＳ Ｐゴシック"/>
+              </a:rPr>
+              <a:t> </a:t>
+            </a:r>
+            <a:r>
+              <a:rPr lang="pt-PT" dirty="0" err="1">
+                <a:latin typeface="Helvetica Neue"/>
+                <a:ea typeface="ＭＳ Ｐゴシック"/>
+              </a:rPr>
+              <a:t>Messages</a:t>
+            </a:r>
+            <a:endParaRPr lang="pt-PT" dirty="0">
+              <a:latin typeface="Helvetica Neue"/>
+              <a:ea typeface="ＭＳ Ｐゴシック"/>
+            </a:endParaRPr>
+          </a:p>
+        </p:txBody>
+      </p:sp>
+      <p:sp>
+        <p:nvSpPr>
+          <p:cNvPr id="5" name="Footer Placeholder 4">
+            <a:extLst>
+              <a:ext uri="{FF2B5EF4-FFF2-40B4-BE49-F238E27FC236}">
+                <a16:creationId xmlns:a16="http://schemas.microsoft.com/office/drawing/2014/main" id="{4A5F06B7-5AE3-8B4A-901A-53BD09B6E7FF}"/>
+              </a:ext>
+            </a:extLst>
+          </p:cNvPr>
+          <p:cNvSpPr>
+            <a:spLocks noGrp="1"/>
+          </p:cNvSpPr>
+          <p:nvPr>
+            <p:ph type="ftr" sz="quarter" idx="11"/>
+          </p:nvPr>
+        </p:nvSpPr>
+        <p:spPr/>
+        <p:txBody>
+          <a:bodyPr/>
+          <a:lstStyle/>
+          <a:p>
+            <a:pPr>
+              <a:defRPr/>
+            </a:pPr>
+            <a:r>
+              <a:rPr lang="en-US" dirty="0"/>
+              <a:t>DETI / MEI / PDE / 2022-23</a:t>
+            </a:r>
+          </a:p>
+        </p:txBody>
+      </p:sp>
+      <p:sp>
+        <p:nvSpPr>
+          <p:cNvPr id="6" name="Slide Number Placeholder 5">
+            <a:extLst>
+              <a:ext uri="{FF2B5EF4-FFF2-40B4-BE49-F238E27FC236}">
+                <a16:creationId xmlns:a16="http://schemas.microsoft.com/office/drawing/2014/main" id="{BA1D1089-536D-1A4F-AA9C-A324816262D3}"/>
+              </a:ext>
+            </a:extLst>
+          </p:cNvPr>
+          <p:cNvSpPr>
+            <a:spLocks noGrp="1"/>
+          </p:cNvSpPr>
+          <p:nvPr>
+            <p:ph type="sldNum" sz="quarter" idx="10"/>
+          </p:nvPr>
+        </p:nvSpPr>
+        <p:spPr/>
+        <p:txBody>
+          <a:bodyPr/>
+          <a:lstStyle/>
+          <a:p>
+            <a:pPr>
+              <a:defRPr/>
+            </a:pPr>
+            <a:fld id="{EF60A818-680D-8044-B769-B122DF9C5B6D}" type="slidenum">
+              <a:rPr lang="en-US" smtClean="0"/>
+              <a:pPr>
+                <a:defRPr/>
+              </a:pPr>
+              <a:t>8</a:t>
+            </a:fld>
+            <a:endParaRPr lang="en-US" dirty="0"/>
+          </a:p>
+        </p:txBody>
+      </p:sp>
+      <p:sp>
+        <p:nvSpPr>
+          <p:cNvPr id="16" name="CaixaDeTexto 15">
+            <a:extLst>
+              <a:ext uri="{FF2B5EF4-FFF2-40B4-BE49-F238E27FC236}">
+                <a16:creationId xmlns:a16="http://schemas.microsoft.com/office/drawing/2014/main" id="{41F136D5-0E36-082C-ACBA-F4DB9F1B806C}"/>
+              </a:ext>
+            </a:extLst>
+          </p:cNvPr>
+          <p:cNvSpPr txBox="1"/>
+          <p:nvPr/>
+        </p:nvSpPr>
+        <p:spPr>
+          <a:xfrm>
+            <a:off x="715035" y="1630893"/>
+            <a:ext cx="6743040" cy="3416320"/>
+          </a:xfrm>
+          <a:prstGeom prst="rect">
+            <a:avLst/>
+          </a:prstGeom>
+          <a:noFill/>
+        </p:spPr>
+        <p:txBody>
+          <a:bodyPr rot="0" spcFirstLastPara="0" vertOverflow="overflow" horzOverflow="overflow" vert="horz" wrap="square" lIns="91440" tIns="45720" rIns="91440" bIns="45720" numCol="1" spcCol="0" rtlCol="0" fromWordArt="0" anchor="t" anchorCtr="0" forceAA="0" compatLnSpc="1">
+            <a:prstTxWarp prst="textNoShape">
+              <a:avLst/>
+            </a:prstTxWarp>
+            <a:spAutoFit/>
+          </a:bodyPr>
+          <a:lstStyle/>
+          <a:p>
+            <a:pPr marL="342900" indent="-342900">
+              <a:buFont typeface="Arial"/>
+              <a:buChar char="•"/>
+            </a:pPr>
+            <a:r>
+              <a:rPr lang="pt-PT" dirty="0">
+                <a:latin typeface="Helvetica Neue"/>
+                <a:ea typeface="ＭＳ Ｐゴシック"/>
+              </a:rPr>
+              <a:t>HEARTBEAT</a:t>
+            </a:r>
+          </a:p>
+          <a:p>
+            <a:pPr marL="342900" indent="-342900">
+              <a:buFont typeface="Arial"/>
+              <a:buChar char="•"/>
+            </a:pPr>
+            <a:r>
+              <a:rPr lang="pt-PT" dirty="0">
+                <a:latin typeface="Helvetica Neue"/>
+                <a:ea typeface="ＭＳ Ｐゴシック"/>
+              </a:rPr>
+              <a:t>SAEM</a:t>
+            </a:r>
+          </a:p>
+          <a:p>
+            <a:pPr marL="800100" lvl="1" indent="-342900">
+              <a:buFont typeface="Arial"/>
+              <a:buChar char="•"/>
+            </a:pPr>
+            <a:r>
+              <a:rPr lang="pt-PT" dirty="0" err="1">
+                <a:latin typeface="Helvetica Neue"/>
+                <a:ea typeface="ＭＳ Ｐゴシック"/>
+              </a:rPr>
+              <a:t>Service</a:t>
+            </a:r>
+            <a:r>
+              <a:rPr lang="pt-PT" dirty="0">
+                <a:latin typeface="Helvetica Neue"/>
+                <a:ea typeface="ＭＳ Ｐゴシック"/>
+              </a:rPr>
+              <a:t> </a:t>
+            </a:r>
+            <a:r>
+              <a:rPr lang="pt-PT" dirty="0" err="1">
+                <a:latin typeface="Helvetica Neue"/>
+                <a:ea typeface="ＭＳ Ｐゴシック"/>
+              </a:rPr>
+              <a:t>Announcement</a:t>
+            </a:r>
+            <a:r>
+              <a:rPr lang="pt-PT" dirty="0">
+                <a:latin typeface="Helvetica Neue"/>
+                <a:ea typeface="ＭＳ Ｐゴシック"/>
+              </a:rPr>
+              <a:t> </a:t>
+            </a:r>
+            <a:r>
+              <a:rPr lang="pt-PT" dirty="0" err="1">
+                <a:latin typeface="Helvetica Neue"/>
+                <a:ea typeface="ＭＳ Ｐゴシック"/>
+              </a:rPr>
+              <a:t>Essential</a:t>
+            </a:r>
+            <a:r>
+              <a:rPr lang="pt-PT" dirty="0">
+                <a:latin typeface="Helvetica Neue"/>
+                <a:ea typeface="ＭＳ Ｐゴシック"/>
+              </a:rPr>
+              <a:t> </a:t>
+            </a:r>
+            <a:r>
+              <a:rPr lang="pt-PT" dirty="0" err="1">
+                <a:latin typeface="Helvetica Neue"/>
+                <a:ea typeface="ＭＳ Ｐゴシック"/>
+              </a:rPr>
+              <a:t>Message</a:t>
+            </a:r>
+            <a:r>
+              <a:rPr lang="pt-PT" dirty="0">
+                <a:latin typeface="Helvetica Neue"/>
+                <a:ea typeface="ＭＳ Ｐゴシック"/>
+              </a:rPr>
+              <a:t> </a:t>
+            </a:r>
+          </a:p>
+          <a:p>
+            <a:pPr marL="342900" indent="-342900">
+              <a:buFont typeface="Arial"/>
+              <a:buChar char="•"/>
+            </a:pPr>
+            <a:r>
+              <a:rPr lang="pt-PT" dirty="0">
+                <a:latin typeface="Helvetica Neue"/>
+                <a:ea typeface="ＭＳ Ｐゴシック"/>
+              </a:rPr>
+              <a:t>TPM</a:t>
+            </a:r>
+          </a:p>
+          <a:p>
+            <a:pPr marL="800100" lvl="1" indent="-342900">
+              <a:buFont typeface="Arial"/>
+              <a:buChar char="•"/>
+            </a:pPr>
+            <a:r>
+              <a:rPr lang="pt-PT" dirty="0" err="1">
+                <a:latin typeface="Helvetica Neue"/>
+                <a:ea typeface="ＭＳ Ｐゴシック"/>
+              </a:rPr>
+              <a:t>Tolling</a:t>
+            </a:r>
+            <a:r>
+              <a:rPr lang="pt-PT" dirty="0">
+                <a:latin typeface="Helvetica Neue"/>
+                <a:ea typeface="ＭＳ Ｐゴシック"/>
+              </a:rPr>
+              <a:t> </a:t>
+            </a:r>
+            <a:r>
+              <a:rPr lang="pt-PT" dirty="0" err="1">
+                <a:latin typeface="Helvetica Neue"/>
+                <a:ea typeface="ＭＳ Ｐゴシック"/>
+              </a:rPr>
+              <a:t>Payment</a:t>
+            </a:r>
+            <a:r>
+              <a:rPr lang="pt-PT" dirty="0">
+                <a:latin typeface="Helvetica Neue"/>
+                <a:ea typeface="ＭＳ Ｐゴシック"/>
+              </a:rPr>
+              <a:t> </a:t>
+            </a:r>
+            <a:r>
+              <a:rPr lang="pt-PT" dirty="0" err="1">
+                <a:latin typeface="Helvetica Neue"/>
+                <a:ea typeface="ＭＳ Ｐゴシック"/>
+              </a:rPr>
+              <a:t>Message</a:t>
+            </a:r>
+            <a:endParaRPr lang="pt-PT" dirty="0">
+              <a:latin typeface="Helvetica Neue"/>
+              <a:ea typeface="ＭＳ Ｐゴシック"/>
+            </a:endParaRPr>
+          </a:p>
+          <a:p>
+            <a:pPr marL="342900" indent="-342900">
+              <a:buFont typeface="Arial"/>
+              <a:buChar char="•"/>
+            </a:pPr>
+            <a:r>
+              <a:rPr lang="pt-PT" dirty="0">
+                <a:latin typeface="Helvetica Neue"/>
+                <a:ea typeface="ＭＳ Ｐゴシック"/>
+              </a:rPr>
+              <a:t>HDMAP</a:t>
+            </a:r>
+          </a:p>
+          <a:p>
+            <a:pPr marL="800100" lvl="1" indent="-342900">
+              <a:buFont typeface="Arial"/>
+              <a:buChar char="•"/>
+            </a:pPr>
+            <a:r>
+              <a:rPr lang="pt-PT" dirty="0" err="1">
+                <a:latin typeface="Helvetica Neue"/>
+                <a:ea typeface="ＭＳ Ｐゴシック"/>
+              </a:rPr>
+              <a:t>High</a:t>
+            </a:r>
+            <a:r>
+              <a:rPr lang="pt-PT" dirty="0">
+                <a:latin typeface="Helvetica Neue"/>
+                <a:ea typeface="ＭＳ Ｐゴシック"/>
+              </a:rPr>
+              <a:t> </a:t>
+            </a:r>
+            <a:r>
+              <a:rPr lang="pt-PT" dirty="0" err="1">
+                <a:latin typeface="Helvetica Neue"/>
+                <a:ea typeface="ＭＳ Ｐゴシック"/>
+              </a:rPr>
+              <a:t>Definition</a:t>
+            </a:r>
+            <a:r>
+              <a:rPr lang="pt-PT" dirty="0">
+                <a:latin typeface="Helvetica Neue"/>
+                <a:ea typeface="ＭＳ Ｐゴシック"/>
+              </a:rPr>
+              <a:t> </a:t>
+            </a:r>
+            <a:r>
+              <a:rPr lang="pt-PT" dirty="0" err="1">
+                <a:latin typeface="Helvetica Neue"/>
+                <a:ea typeface="ＭＳ Ｐゴシック"/>
+              </a:rPr>
+              <a:t>Map</a:t>
+            </a:r>
+            <a:endParaRPr lang="pt-PT" dirty="0">
+              <a:latin typeface="Helvetica Neue"/>
+              <a:ea typeface="ＭＳ Ｐゴシック"/>
+            </a:endParaRPr>
+          </a:p>
+          <a:p>
+            <a:pPr marL="800100" lvl="1" indent="-342900">
+              <a:buFont typeface="Arial"/>
+              <a:buChar char="•"/>
+            </a:pPr>
+            <a:endParaRPr lang="pt-PT" dirty="0">
+              <a:latin typeface="Helvetica Neue"/>
+              <a:ea typeface="ＭＳ Ｐゴシック"/>
+            </a:endParaRPr>
+          </a:p>
+        </p:txBody>
+      </p:sp>
+      <p:grpSp>
+        <p:nvGrpSpPr>
+          <p:cNvPr id="11" name="Group 10">
+            <a:extLst>
+              <a:ext uri="{FF2B5EF4-FFF2-40B4-BE49-F238E27FC236}">
+                <a16:creationId xmlns:a16="http://schemas.microsoft.com/office/drawing/2014/main" id="{4041451D-8B8B-1778-BB94-2AB5992D4549}"/>
+              </a:ext>
+            </a:extLst>
+          </p:cNvPr>
+          <p:cNvGrpSpPr/>
+          <p:nvPr/>
+        </p:nvGrpSpPr>
+        <p:grpSpPr>
+          <a:xfrm>
+            <a:off x="9857055" y="1446340"/>
+            <a:ext cx="1725345" cy="4484549"/>
+            <a:chOff x="9857053" y="1415219"/>
+            <a:chExt cx="1725345" cy="4484549"/>
+          </a:xfrm>
+        </p:grpSpPr>
+        <p:pic>
+          <p:nvPicPr>
+            <p:cNvPr id="8" name="Imagem 8">
+              <a:extLst>
+                <a:ext uri="{FF2B5EF4-FFF2-40B4-BE49-F238E27FC236}">
+                  <a16:creationId xmlns:a16="http://schemas.microsoft.com/office/drawing/2014/main" id="{9917A3FF-FAA6-036A-D43D-8A94A21A1B14}"/>
+                </a:ext>
+              </a:extLst>
+            </p:cNvPr>
+            <p:cNvPicPr>
+              <a:picLocks noChangeAspect="1"/>
+            </p:cNvPicPr>
+            <p:nvPr/>
+          </p:nvPicPr>
+          <p:blipFill>
+            <a:blip r:embed="rId2" cstate="hqprint">
+              <a:extLst>
+                <a:ext uri="{28A0092B-C50C-407E-A947-70E740481C1C}">
+                  <a14:useLocalDpi xmlns:a14="http://schemas.microsoft.com/office/drawing/2010/main"/>
+                </a:ext>
+              </a:extLst>
+            </a:blip>
+            <a:stretch>
+              <a:fillRect/>
+            </a:stretch>
+          </p:blipFill>
+          <p:spPr>
+            <a:xfrm>
+              <a:off x="9857053" y="1415219"/>
+              <a:ext cx="1725345" cy="3908825"/>
+            </a:xfrm>
+            <a:prstGeom prst="rect">
+              <a:avLst/>
+            </a:prstGeom>
+          </p:spPr>
+        </p:pic>
+        <p:sp>
+          <p:nvSpPr>
+            <p:cNvPr id="12" name="CaixaDeTexto 11">
+              <a:extLst>
+                <a:ext uri="{FF2B5EF4-FFF2-40B4-BE49-F238E27FC236}">
+                  <a16:creationId xmlns:a16="http://schemas.microsoft.com/office/drawing/2014/main" id="{35371680-1151-1122-B188-78A9D6F8A1DB}"/>
+                </a:ext>
+              </a:extLst>
+            </p:cNvPr>
+            <p:cNvSpPr txBox="1"/>
+            <p:nvPr/>
+          </p:nvSpPr>
+          <p:spPr>
+            <a:xfrm>
+              <a:off x="10108961" y="5431991"/>
+              <a:ext cx="1221527" cy="467777"/>
+            </a:xfrm>
+            <a:prstGeom prst="rect">
+              <a:avLst/>
+            </a:prstGeom>
+            <a:noFill/>
+          </p:spPr>
+          <p:txBody>
+            <a:bodyPr rot="0" spcFirstLastPara="0" vertOverflow="overflow" horzOverflow="overflow" vert="horz" wrap="square" lIns="91440" tIns="45720" rIns="91440" bIns="45720" numCol="1" spcCol="0" rtlCol="0" fromWordArt="0" anchor="ctr" anchorCtr="0" forceAA="0" compatLnSpc="1">
+              <a:prstTxWarp prst="textNoShape">
+                <a:avLst/>
+              </a:prstTxWarp>
+              <a:spAutoFit/>
+            </a:bodyPr>
+            <a:lstStyle/>
+            <a:p>
+              <a:pPr algn="ctr"/>
+              <a:r>
+                <a:rPr lang="pt-PT" sz="1600" dirty="0">
+                  <a:latin typeface="Arial"/>
+                  <a:ea typeface="ＭＳ Ｐゴシック"/>
+                </a:rPr>
+                <a:t>HDMAP</a:t>
+              </a:r>
+              <a:endParaRPr lang="pt-PT" sz="1600" dirty="0"/>
+            </a:p>
+          </p:txBody>
+        </p:sp>
+      </p:grpSp>
+      <p:grpSp>
+        <p:nvGrpSpPr>
+          <p:cNvPr id="17" name="Group 16">
+            <a:extLst>
+              <a:ext uri="{FF2B5EF4-FFF2-40B4-BE49-F238E27FC236}">
+                <a16:creationId xmlns:a16="http://schemas.microsoft.com/office/drawing/2014/main" id="{ABEBC95B-B6C3-66E7-4F10-FD9C13D70894}"/>
+              </a:ext>
+            </a:extLst>
+          </p:cNvPr>
+          <p:cNvGrpSpPr/>
+          <p:nvPr/>
+        </p:nvGrpSpPr>
+        <p:grpSpPr>
+          <a:xfrm>
+            <a:off x="7551829" y="1446341"/>
+            <a:ext cx="1801723" cy="4543048"/>
+            <a:chOff x="7475627" y="1415220"/>
+            <a:chExt cx="1801723" cy="4543048"/>
+          </a:xfrm>
+        </p:grpSpPr>
+        <p:pic>
+          <p:nvPicPr>
+            <p:cNvPr id="7" name="Picture 6" descr="Map&#10;&#10;Description automatically generated">
+              <a:extLst>
+                <a:ext uri="{FF2B5EF4-FFF2-40B4-BE49-F238E27FC236}">
+                  <a16:creationId xmlns:a16="http://schemas.microsoft.com/office/drawing/2014/main" id="{6766297F-5BFA-9506-7A2B-C76F2F405CFF}"/>
+                </a:ext>
+              </a:extLst>
+            </p:cNvPr>
+            <p:cNvPicPr>
+              <a:picLocks noChangeAspect="1"/>
+            </p:cNvPicPr>
+            <p:nvPr/>
+          </p:nvPicPr>
+          <p:blipFill>
+            <a:blip r:embed="rId3" cstate="email">
+              <a:extLst>
+                <a:ext uri="{28A0092B-C50C-407E-A947-70E740481C1C}">
+                  <a14:useLocalDpi xmlns:a14="http://schemas.microsoft.com/office/drawing/2010/main" val="0"/>
+                </a:ext>
+              </a:extLst>
+            </a:blip>
+            <a:stretch>
+              <a:fillRect/>
+            </a:stretch>
+          </p:blipFill>
+          <p:spPr>
+            <a:xfrm>
+              <a:off x="7475627" y="1415220"/>
+              <a:ext cx="1801723" cy="3908824"/>
+            </a:xfrm>
+            <a:prstGeom prst="rect">
+              <a:avLst/>
+            </a:prstGeom>
+          </p:spPr>
+        </p:pic>
+        <p:sp>
+          <p:nvSpPr>
+            <p:cNvPr id="10" name="CaixaDeTexto 11">
+              <a:extLst>
+                <a:ext uri="{FF2B5EF4-FFF2-40B4-BE49-F238E27FC236}">
+                  <a16:creationId xmlns:a16="http://schemas.microsoft.com/office/drawing/2014/main" id="{C6959411-35F0-0213-70BF-6AA5285EBA28}"/>
+                </a:ext>
+              </a:extLst>
+            </p:cNvPr>
+            <p:cNvSpPr txBox="1"/>
+            <p:nvPr/>
+          </p:nvSpPr>
+          <p:spPr>
+            <a:xfrm>
+              <a:off x="7765724" y="5373493"/>
+              <a:ext cx="1221527" cy="584775"/>
+            </a:xfrm>
+            <a:prstGeom prst="rect">
+              <a:avLst/>
+            </a:prstGeom>
+            <a:noFill/>
+          </p:spPr>
+          <p:txBody>
+            <a:bodyPr rot="0" spcFirstLastPara="0" vertOverflow="overflow" horzOverflow="overflow" vert="horz" wrap="square" lIns="91440" tIns="45720" rIns="91440" bIns="45720" numCol="1" spcCol="0" rtlCol="0" fromWordArt="0" anchor="ctr" anchorCtr="0" forceAA="0" compatLnSpc="1">
+              <a:prstTxWarp prst="textNoShape">
+                <a:avLst/>
+              </a:prstTxWarp>
+              <a:spAutoFit/>
+            </a:bodyPr>
+            <a:lstStyle/>
+            <a:p>
+              <a:pPr algn="ctr"/>
+              <a:r>
+                <a:rPr lang="pt-PT" sz="1600" dirty="0">
+                  <a:latin typeface="Arial"/>
+                  <a:ea typeface="ＭＳ Ｐゴシック"/>
+                </a:rPr>
+                <a:t>SAEM </a:t>
+              </a:r>
+              <a:r>
+                <a:rPr lang="pt-PT" sz="1600" dirty="0" err="1">
+                  <a:latin typeface="Arial"/>
+                  <a:ea typeface="ＭＳ Ｐゴシック"/>
+                </a:rPr>
+                <a:t>and</a:t>
+              </a:r>
+              <a:r>
+                <a:rPr lang="pt-PT" sz="1600" dirty="0">
+                  <a:latin typeface="Arial"/>
+                  <a:ea typeface="ＭＳ Ｐゴシック"/>
+                </a:rPr>
+                <a:t> TPM</a:t>
+              </a:r>
+              <a:endParaRPr lang="pt-PT" sz="1600" dirty="0"/>
+            </a:p>
+          </p:txBody>
+        </p:sp>
+      </p:grpSp>
       <p:pic>
         <p:nvPicPr>
-          <p:cNvPr id="11" name="Picture 10">
+          <p:cNvPr id="19" name="Picture 18" descr="Shape&#10;&#10;Description automatically generated with low confidence">
             <a:extLst>
               <a:ext uri="{FF2B5EF4-FFF2-40B4-BE49-F238E27FC236}">
-                <a16:creationId xmlns:a16="http://schemas.microsoft.com/office/drawing/2014/main" id="{9AAE1F21-1949-03A0-59E3-9D1028CB4175}"/>
+                <a16:creationId xmlns:a16="http://schemas.microsoft.com/office/drawing/2014/main" id="{4E2DF3D3-14D0-6087-891F-FB2D844AA74B}"/>
               </a:ext>
             </a:extLst>
           </p:cNvPr>
@@ -3750,25 +6893,596 @@
           <p:nvPr/>
         </p:nvPicPr>
         <p:blipFill>
-          <a:blip r:embed="rId3"/>
+          <a:blip r:embed="rId4">
+            <a:extLst>
+              <a:ext uri="{28A0092B-C50C-407E-A947-70E740481C1C}">
+                <a14:useLocalDpi xmlns:a14="http://schemas.microsoft.com/office/drawing/2010/main" val="0"/>
+              </a:ext>
+            </a:extLst>
+          </a:blip>
           <a:stretch>
             <a:fillRect/>
           </a:stretch>
         </p:blipFill>
         <p:spPr>
           <a:xfrm>
-            <a:off x="6187870" y="2162712"/>
-            <a:ext cx="6684567" cy="3444518"/>
+            <a:off x="6200113" y="4262585"/>
+            <a:ext cx="952500" cy="952500"/>
           </a:xfrm>
           <a:prstGeom prst="rect">
             <a:avLst/>
           </a:prstGeom>
         </p:spPr>
       </p:pic>
+      <p:sp>
+        <p:nvSpPr>
+          <p:cNvPr id="20" name="CaixaDeTexto 13">
+            <a:extLst>
+              <a:ext uri="{FF2B5EF4-FFF2-40B4-BE49-F238E27FC236}">
+                <a16:creationId xmlns:a16="http://schemas.microsoft.com/office/drawing/2014/main" id="{16B9171B-1198-FD46-7586-BD4775ACBB9B}"/>
+              </a:ext>
+            </a:extLst>
+          </p:cNvPr>
+          <p:cNvSpPr txBox="1"/>
+          <p:nvPr/>
+        </p:nvSpPr>
+        <p:spPr>
+          <a:xfrm>
+            <a:off x="5891662" y="5522761"/>
+            <a:ext cx="1408459" cy="338554"/>
+          </a:xfrm>
+          <a:prstGeom prst="rect">
+            <a:avLst/>
+          </a:prstGeom>
+          <a:noFill/>
+        </p:spPr>
+        <p:txBody>
+          <a:bodyPr rot="0" spcFirstLastPara="0" vertOverflow="overflow" horzOverflow="overflow" vert="horz" wrap="square" lIns="91440" tIns="45720" rIns="91440" bIns="45720" numCol="1" spcCol="0" rtlCol="0" fromWordArt="0" anchor="ctr" anchorCtr="0" forceAA="0" compatLnSpc="1">
+            <a:prstTxWarp prst="textNoShape">
+              <a:avLst/>
+            </a:prstTxWarp>
+            <a:spAutoFit/>
+          </a:bodyPr>
+          <a:lstStyle/>
+          <a:p>
+            <a:pPr algn="ctr"/>
+            <a:r>
+              <a:rPr lang="pt-PT" sz="1600" dirty="0"/>
+              <a:t>HEARTBEAT</a:t>
+            </a:r>
+          </a:p>
+        </p:txBody>
+      </p:sp>
     </p:spTree>
     <p:extLst>
       <p:ext uri="{BB962C8B-B14F-4D97-AF65-F5344CB8AC3E}">
-        <p14:creationId xmlns:p14="http://schemas.microsoft.com/office/powerpoint/2010/main" val="2252609942"/>
+        <p14:creationId xmlns:p14="http://schemas.microsoft.com/office/powerpoint/2010/main" val="345722980"/>
+      </p:ext>
+    </p:extLst>
+  </p:cSld>
+  <p:clrMapOvr>
+    <a:masterClrMapping/>
+  </p:clrMapOvr>
+</p:sld>
+</file>
+
+<file path=ppt/slides/slide9.xml><?xml version="1.0" encoding="utf-8"?>
+<p:sld xmlns:a="http://schemas.openxmlformats.org/drawingml/2006/main" xmlns:r="http://schemas.openxmlformats.org/officeDocument/2006/relationships" xmlns:p="http://schemas.openxmlformats.org/presentationml/2006/main">
+  <p:cSld>
+    <p:spTree>
+      <p:nvGrpSpPr>
+        <p:cNvPr id="1" name=""/>
+        <p:cNvGrpSpPr/>
+        <p:nvPr/>
+      </p:nvGrpSpPr>
+      <p:grpSpPr>
+        <a:xfrm>
+          <a:off x="0" y="0"/>
+          <a:ext cx="0" cy="0"/>
+          <a:chOff x="0" y="0"/>
+          <a:chExt cx="0" cy="0"/>
+        </a:xfrm>
+      </p:grpSpPr>
+      <p:sp>
+        <p:nvSpPr>
+          <p:cNvPr id="2" name="Title 1">
+            <a:extLst>
+              <a:ext uri="{FF2B5EF4-FFF2-40B4-BE49-F238E27FC236}">
+                <a16:creationId xmlns:a16="http://schemas.microsoft.com/office/drawing/2014/main" id="{5C1FD17E-CA27-3943-80DF-1AAF2EBDED63}"/>
+              </a:ext>
+            </a:extLst>
+          </p:cNvPr>
+          <p:cNvSpPr>
+            <a:spLocks noGrp="1"/>
+          </p:cNvSpPr>
+          <p:nvPr>
+            <p:ph type="title"/>
+          </p:nvPr>
+        </p:nvSpPr>
+        <p:spPr/>
+        <p:txBody>
+          <a:bodyPr/>
+          <a:lstStyle/>
+          <a:p>
+            <a:pPr marL="30480" indent="0">
+              <a:buNone/>
+            </a:pPr>
+            <a:r>
+              <a:rPr lang="en-GB" dirty="0">
+                <a:latin typeface="Helvetica Neue"/>
+              </a:rPr>
+              <a:t>Sensor Messages</a:t>
+            </a:r>
+            <a:endParaRPr lang="pt-PT" dirty="0"/>
+          </a:p>
+        </p:txBody>
+      </p:sp>
+      <p:sp>
+        <p:nvSpPr>
+          <p:cNvPr id="5" name="Footer Placeholder 4">
+            <a:extLst>
+              <a:ext uri="{FF2B5EF4-FFF2-40B4-BE49-F238E27FC236}">
+                <a16:creationId xmlns:a16="http://schemas.microsoft.com/office/drawing/2014/main" id="{4A5F06B7-5AE3-8B4A-901A-53BD09B6E7FF}"/>
+              </a:ext>
+            </a:extLst>
+          </p:cNvPr>
+          <p:cNvSpPr>
+            <a:spLocks noGrp="1"/>
+          </p:cNvSpPr>
+          <p:nvPr>
+            <p:ph type="ftr" sz="quarter" idx="11"/>
+          </p:nvPr>
+        </p:nvSpPr>
+        <p:spPr/>
+        <p:txBody>
+          <a:bodyPr/>
+          <a:lstStyle/>
+          <a:p>
+            <a:pPr>
+              <a:defRPr/>
+            </a:pPr>
+            <a:r>
+              <a:rPr lang="en-US" dirty="0"/>
+              <a:t>DETI / MEI / PDE / 2022-23</a:t>
+            </a:r>
+          </a:p>
+        </p:txBody>
+      </p:sp>
+      <p:sp>
+        <p:nvSpPr>
+          <p:cNvPr id="6" name="Slide Number Placeholder 5">
+            <a:extLst>
+              <a:ext uri="{FF2B5EF4-FFF2-40B4-BE49-F238E27FC236}">
+                <a16:creationId xmlns:a16="http://schemas.microsoft.com/office/drawing/2014/main" id="{BA1D1089-536D-1A4F-AA9C-A324816262D3}"/>
+              </a:ext>
+            </a:extLst>
+          </p:cNvPr>
+          <p:cNvSpPr>
+            <a:spLocks noGrp="1"/>
+          </p:cNvSpPr>
+          <p:nvPr>
+            <p:ph type="sldNum" sz="quarter" idx="10"/>
+          </p:nvPr>
+        </p:nvSpPr>
+        <p:spPr/>
+        <p:txBody>
+          <a:bodyPr/>
+          <a:lstStyle/>
+          <a:p>
+            <a:pPr>
+              <a:defRPr/>
+            </a:pPr>
+            <a:fld id="{EF60A818-680D-8044-B769-B122DF9C5B6D}" type="slidenum">
+              <a:rPr lang="en-US" smtClean="0"/>
+              <a:pPr>
+                <a:defRPr/>
+              </a:pPr>
+              <a:t>9</a:t>
+            </a:fld>
+            <a:endParaRPr lang="en-US" dirty="0"/>
+          </a:p>
+        </p:txBody>
+      </p:sp>
+      <p:sp>
+        <p:nvSpPr>
+          <p:cNvPr id="20" name="CaixaDeTexto 15">
+            <a:extLst>
+              <a:ext uri="{FF2B5EF4-FFF2-40B4-BE49-F238E27FC236}">
+                <a16:creationId xmlns:a16="http://schemas.microsoft.com/office/drawing/2014/main" id="{24678BAA-3399-0269-C0D3-33F9218C4323}"/>
+              </a:ext>
+            </a:extLst>
+          </p:cNvPr>
+          <p:cNvSpPr txBox="1"/>
+          <p:nvPr/>
+        </p:nvSpPr>
+        <p:spPr>
+          <a:xfrm>
+            <a:off x="609598" y="1292599"/>
+            <a:ext cx="4972051" cy="3416320"/>
+          </a:xfrm>
+          <a:prstGeom prst="rect">
+            <a:avLst/>
+          </a:prstGeom>
+          <a:noFill/>
+        </p:spPr>
+        <p:txBody>
+          <a:bodyPr rot="0" spcFirstLastPara="0" vertOverflow="overflow" horzOverflow="overflow" vert="horz" wrap="square" lIns="91440" tIns="45720" rIns="91440" bIns="45720" numCol="1" spcCol="0" rtlCol="0" fromWordArt="0" anchor="t" anchorCtr="0" forceAA="0" compatLnSpc="1">
+            <a:prstTxWarp prst="textNoShape">
+              <a:avLst/>
+            </a:prstTxWarp>
+            <a:spAutoFit/>
+          </a:bodyPr>
+          <a:lstStyle/>
+          <a:p>
+            <a:pPr marL="342900" indent="-342900">
+              <a:buFont typeface="Arial"/>
+              <a:buChar char="•"/>
+            </a:pPr>
+            <a:r>
+              <a:rPr lang="pt-PT" dirty="0">
+                <a:latin typeface="Helvetica Neue"/>
+                <a:ea typeface="ＭＳ Ｐゴシック"/>
+              </a:rPr>
+              <a:t>VSM</a:t>
+            </a:r>
+          </a:p>
+          <a:p>
+            <a:pPr marL="800100" lvl="1" indent="-342900">
+              <a:buFont typeface="Arial"/>
+              <a:buChar char="•"/>
+            </a:pPr>
+            <a:r>
+              <a:rPr lang="pt-PT" dirty="0" err="1">
+                <a:latin typeface="Helvetica Neue"/>
+                <a:ea typeface="ＭＳ Ｐゴシック"/>
+              </a:rPr>
+              <a:t>Vehicular</a:t>
+            </a:r>
+            <a:r>
+              <a:rPr lang="pt-PT" dirty="0">
+                <a:latin typeface="Helvetica Neue"/>
+                <a:ea typeface="ＭＳ Ｐゴシック"/>
+              </a:rPr>
+              <a:t> Sensor </a:t>
+            </a:r>
+            <a:r>
+              <a:rPr lang="pt-PT" dirty="0" err="1">
+                <a:latin typeface="Helvetica Neue"/>
+                <a:ea typeface="ＭＳ Ｐゴシック"/>
+              </a:rPr>
+              <a:t>Message</a:t>
+            </a:r>
+            <a:endParaRPr lang="pt-PT" dirty="0">
+              <a:latin typeface="Helvetica Neue"/>
+              <a:ea typeface="ＭＳ Ｐゴシック"/>
+            </a:endParaRPr>
+          </a:p>
+          <a:p>
+            <a:pPr marL="800100" lvl="1" indent="-342900">
+              <a:buFont typeface="Arial"/>
+              <a:buChar char="•"/>
+            </a:pPr>
+            <a:r>
+              <a:rPr lang="pt-PT" dirty="0">
+                <a:latin typeface="Helvetica Neue"/>
+                <a:ea typeface="ＭＳ Ｐゴシック"/>
+              </a:rPr>
+              <a:t>SPVSM</a:t>
+            </a:r>
+          </a:p>
+          <a:p>
+            <a:pPr marL="1257300" lvl="2" indent="-342900">
+              <a:buFont typeface="Arial"/>
+              <a:buChar char="•"/>
+            </a:pPr>
+            <a:r>
+              <a:rPr lang="pt-PT" dirty="0" err="1">
+                <a:latin typeface="Helvetica Neue"/>
+                <a:ea typeface="ＭＳ Ｐゴシック"/>
+              </a:rPr>
+              <a:t>SmartPhone</a:t>
+            </a:r>
+            <a:r>
+              <a:rPr lang="pt-PT" dirty="0">
+                <a:latin typeface="Helvetica Neue"/>
+                <a:ea typeface="ＭＳ Ｐゴシック"/>
+              </a:rPr>
+              <a:t> VSM</a:t>
+            </a:r>
+          </a:p>
+          <a:p>
+            <a:pPr marL="1257300" lvl="2" indent="-342900">
+              <a:buFont typeface="Arial"/>
+              <a:buChar char="•"/>
+            </a:pPr>
+            <a:r>
+              <a:rPr lang="pt-PT" dirty="0">
+                <a:latin typeface="Helvetica Neue"/>
+                <a:ea typeface="ＭＳ Ｐゴシック"/>
+              </a:rPr>
+              <a:t>Expo-</a:t>
+            </a:r>
+            <a:r>
+              <a:rPr lang="pt-PT" dirty="0" err="1">
+                <a:latin typeface="Helvetica Neue"/>
+                <a:ea typeface="ＭＳ Ｐゴシック"/>
+              </a:rPr>
+              <a:t>Sensors</a:t>
+            </a:r>
+            <a:endParaRPr lang="pt-PT" dirty="0">
+              <a:latin typeface="Helvetica Neue"/>
+              <a:ea typeface="ＭＳ Ｐゴシック"/>
+            </a:endParaRPr>
+          </a:p>
+          <a:p>
+            <a:pPr marL="800100" lvl="1" indent="-342900">
+              <a:buFont typeface="Arial"/>
+              <a:buChar char="•"/>
+            </a:pPr>
+            <a:r>
+              <a:rPr lang="pt-PT" dirty="0">
+                <a:latin typeface="Helvetica Neue"/>
+                <a:ea typeface="ＭＳ Ｐゴシック"/>
+              </a:rPr>
+              <a:t>OVSM</a:t>
+            </a:r>
+          </a:p>
+          <a:p>
+            <a:pPr marL="1257300" lvl="2" indent="-342900">
+              <a:buFont typeface="Arial"/>
+              <a:buChar char="•"/>
+            </a:pPr>
+            <a:r>
+              <a:rPr lang="pt-PT" dirty="0">
+                <a:latin typeface="Helvetica Neue"/>
+                <a:ea typeface="ＭＳ Ｐゴシック"/>
+              </a:rPr>
+              <a:t>OBD-II VSM</a:t>
+            </a:r>
+          </a:p>
+          <a:p>
+            <a:pPr marL="800100" lvl="1" indent="-342900">
+              <a:buFont typeface="Arial"/>
+              <a:buChar char="•"/>
+            </a:pPr>
+            <a:r>
+              <a:rPr lang="pt-PT" dirty="0">
+                <a:latin typeface="Helvetica Neue"/>
+                <a:ea typeface="ＭＳ Ｐゴシック"/>
+              </a:rPr>
+              <a:t>SNVSM</a:t>
+            </a:r>
+          </a:p>
+          <a:p>
+            <a:pPr marL="1257300" lvl="2" indent="-342900">
+              <a:buFont typeface="Arial"/>
+              <a:buChar char="•"/>
+            </a:pPr>
+            <a:r>
+              <a:rPr lang="pt-PT" dirty="0" err="1">
+                <a:latin typeface="Helvetica Neue"/>
+                <a:ea typeface="ＭＳ Ｐゴシック"/>
+              </a:rPr>
+              <a:t>SoNar</a:t>
+            </a:r>
+            <a:r>
+              <a:rPr lang="pt-PT" dirty="0">
+                <a:latin typeface="Helvetica Neue"/>
+                <a:ea typeface="ＭＳ Ｐゴシック"/>
+              </a:rPr>
+              <a:t> VSM</a:t>
+            </a:r>
+          </a:p>
+        </p:txBody>
+      </p:sp>
+      <p:grpSp>
+        <p:nvGrpSpPr>
+          <p:cNvPr id="23" name="Group 22">
+            <a:extLst>
+              <a:ext uri="{FF2B5EF4-FFF2-40B4-BE49-F238E27FC236}">
+                <a16:creationId xmlns:a16="http://schemas.microsoft.com/office/drawing/2014/main" id="{7F990A81-A25F-93FE-3F7E-4CA99CA3D603}"/>
+              </a:ext>
+            </a:extLst>
+          </p:cNvPr>
+          <p:cNvGrpSpPr/>
+          <p:nvPr/>
+        </p:nvGrpSpPr>
+        <p:grpSpPr>
+          <a:xfrm>
+            <a:off x="5867400" y="1292599"/>
+            <a:ext cx="5715000" cy="5003425"/>
+            <a:chOff x="6291263" y="1549775"/>
+            <a:chExt cx="5291137" cy="4675288"/>
+          </a:xfrm>
+        </p:grpSpPr>
+        <p:grpSp>
+          <p:nvGrpSpPr>
+            <p:cNvPr id="19" name="Group 18">
+              <a:extLst>
+                <a:ext uri="{FF2B5EF4-FFF2-40B4-BE49-F238E27FC236}">
+                  <a16:creationId xmlns:a16="http://schemas.microsoft.com/office/drawing/2014/main" id="{F9525AD2-5EC9-1237-D58C-9993F3709946}"/>
+                </a:ext>
+              </a:extLst>
+            </p:cNvPr>
+            <p:cNvGrpSpPr/>
+            <p:nvPr/>
+          </p:nvGrpSpPr>
+          <p:grpSpPr>
+            <a:xfrm>
+              <a:off x="6291263" y="1549775"/>
+              <a:ext cx="5291137" cy="3948112"/>
+              <a:chOff x="6488906" y="1223963"/>
+              <a:chExt cx="5536406" cy="4410074"/>
+            </a:xfrm>
+          </p:grpSpPr>
+          <p:pic>
+            <p:nvPicPr>
+              <p:cNvPr id="17" name="Picture 16" descr="Table&#10;&#10;Description automatically generated with low confidence">
+                <a:extLst>
+                  <a:ext uri="{FF2B5EF4-FFF2-40B4-BE49-F238E27FC236}">
+                    <a16:creationId xmlns:a16="http://schemas.microsoft.com/office/drawing/2014/main" id="{5D8FE34C-0DA1-994C-528E-9FC40D141EA1}"/>
+                  </a:ext>
+                </a:extLst>
+              </p:cNvPr>
+              <p:cNvPicPr>
+                <a:picLocks noChangeAspect="1"/>
+              </p:cNvPicPr>
+              <p:nvPr/>
+            </p:nvPicPr>
+            <p:blipFill>
+              <a:blip r:embed="rId2" cstate="email">
+                <a:extLst>
+                  <a:ext uri="{28A0092B-C50C-407E-A947-70E740481C1C}">
+                    <a14:useLocalDpi xmlns:a14="http://schemas.microsoft.com/office/drawing/2010/main" val="0"/>
+                  </a:ext>
+                </a:extLst>
+              </a:blip>
+              <a:stretch>
+                <a:fillRect/>
+              </a:stretch>
+            </p:blipFill>
+            <p:spPr>
+              <a:xfrm>
+                <a:off x="6488906" y="1223963"/>
+                <a:ext cx="2205037" cy="4410074"/>
+              </a:xfrm>
+              <a:prstGeom prst="rect">
+                <a:avLst/>
+              </a:prstGeom>
+            </p:spPr>
+          </p:pic>
+          <p:pic>
+            <p:nvPicPr>
+              <p:cNvPr id="18" name="Picture 17" descr="Table&#10;&#10;Description automatically generated with low confidence">
+                <a:extLst>
+                  <a:ext uri="{FF2B5EF4-FFF2-40B4-BE49-F238E27FC236}">
+                    <a16:creationId xmlns:a16="http://schemas.microsoft.com/office/drawing/2014/main" id="{A614035D-402D-224C-C526-96EE29304A4A}"/>
+                  </a:ext>
+                </a:extLst>
+              </p:cNvPr>
+              <p:cNvPicPr>
+                <a:picLocks noChangeAspect="1"/>
+              </p:cNvPicPr>
+              <p:nvPr/>
+            </p:nvPicPr>
+            <p:blipFill>
+              <a:blip r:embed="rId3" cstate="email">
+                <a:extLst>
+                  <a:ext uri="{28A0092B-C50C-407E-A947-70E740481C1C}">
+                    <a14:useLocalDpi xmlns:a14="http://schemas.microsoft.com/office/drawing/2010/main" val="0"/>
+                  </a:ext>
+                </a:extLst>
+              </a:blip>
+              <a:stretch>
+                <a:fillRect/>
+              </a:stretch>
+            </p:blipFill>
+            <p:spPr>
+              <a:xfrm>
+                <a:off x="9820275" y="1223963"/>
+                <a:ext cx="2205037" cy="4410074"/>
+              </a:xfrm>
+              <a:prstGeom prst="rect">
+                <a:avLst/>
+              </a:prstGeom>
+            </p:spPr>
+          </p:pic>
+        </p:grpSp>
+        <p:sp>
+          <p:nvSpPr>
+            <p:cNvPr id="21" name="TextBox 20">
+              <a:extLst>
+                <a:ext uri="{FF2B5EF4-FFF2-40B4-BE49-F238E27FC236}">
+                  <a16:creationId xmlns:a16="http://schemas.microsoft.com/office/drawing/2014/main" id="{2C48894F-50D5-A5C2-50C0-4980139C0E33}"/>
+                </a:ext>
+              </a:extLst>
+            </p:cNvPr>
+            <p:cNvSpPr txBox="1"/>
+            <p:nvPr/>
+          </p:nvSpPr>
+          <p:spPr>
+            <a:xfrm>
+              <a:off x="6876700" y="5640288"/>
+              <a:ext cx="936475" cy="584775"/>
+            </a:xfrm>
+            <a:prstGeom prst="rect">
+              <a:avLst/>
+            </a:prstGeom>
+            <a:noFill/>
+          </p:spPr>
+          <p:txBody>
+            <a:bodyPr wrap="none" rtlCol="0">
+              <a:spAutoFit/>
+            </a:bodyPr>
+            <a:lstStyle/>
+            <a:p>
+              <a:pPr algn="ctr"/>
+              <a:r>
+                <a:rPr lang="pt-PT" sz="1600" dirty="0" err="1"/>
+                <a:t>Phone</a:t>
+              </a:r>
+              <a:endParaRPr lang="pt-PT" sz="1600" dirty="0"/>
+            </a:p>
+            <a:p>
+              <a:pPr algn="ctr"/>
+              <a:r>
+                <a:rPr lang="pt-PT" sz="1600" dirty="0" err="1"/>
+                <a:t>Sensors</a:t>
+              </a:r>
+              <a:endParaRPr lang="pt-PT" sz="1600" dirty="0"/>
+            </a:p>
+          </p:txBody>
+        </p:sp>
+        <p:sp>
+          <p:nvSpPr>
+            <p:cNvPr id="22" name="TextBox 21">
+              <a:extLst>
+                <a:ext uri="{FF2B5EF4-FFF2-40B4-BE49-F238E27FC236}">
+                  <a16:creationId xmlns:a16="http://schemas.microsoft.com/office/drawing/2014/main" id="{7F4F00D5-B58D-2E5E-05A8-B49C5A6524E5}"/>
+                </a:ext>
+              </a:extLst>
+            </p:cNvPr>
+            <p:cNvSpPr txBox="1"/>
+            <p:nvPr/>
+          </p:nvSpPr>
+          <p:spPr>
+            <a:xfrm>
+              <a:off x="10060486" y="5640288"/>
+              <a:ext cx="936475" cy="584775"/>
+            </a:xfrm>
+            <a:prstGeom prst="rect">
+              <a:avLst/>
+            </a:prstGeom>
+            <a:noFill/>
+          </p:spPr>
+          <p:txBody>
+            <a:bodyPr wrap="none" rtlCol="0">
+              <a:spAutoFit/>
+            </a:bodyPr>
+            <a:lstStyle/>
+            <a:p>
+              <a:pPr algn="ctr"/>
+              <a:r>
+                <a:rPr lang="pt-PT" sz="1600" dirty="0" err="1"/>
+                <a:t>Vehicle</a:t>
+              </a:r>
+              <a:endParaRPr lang="pt-PT" sz="1600" dirty="0"/>
+            </a:p>
+            <a:p>
+              <a:pPr algn="ctr"/>
+              <a:r>
+                <a:rPr lang="pt-PT" sz="1600" dirty="0" err="1"/>
+                <a:t>Sensors</a:t>
+              </a:r>
+              <a:endParaRPr lang="pt-PT" sz="1600" dirty="0"/>
+            </a:p>
+          </p:txBody>
+        </p:sp>
+      </p:grpSp>
+    </p:spTree>
+    <p:extLst>
+      <p:ext uri="{BB962C8B-B14F-4D97-AF65-F5344CB8AC3E}">
+        <p14:creationId xmlns:p14="http://schemas.microsoft.com/office/powerpoint/2010/main" val="937505489"/>
       </p:ext>
     </p:extLst>
   </p:cSld>

</xml_diff>